<commit_message>
Replacing Auto Increment with IDENTITY
</commit_message>
<xml_diff>
--- a/Week6/Week6.pptx
+++ b/Week6/Week6.pptx
@@ -138,6 +138,11 @@
       </a:defRPr>
     </a:lvl9pPr>
   </p:defaultTextStyle>
+  <p:extLst>
+    <p:ext uri="{EFAFB233-063F-42B5-8137-9DF3F51BA10A}">
+      <p15:sldGuideLst xmlns:p15="http://schemas.microsoft.com/office/powerpoint/2012/main"/>
+    </p:ext>
+  </p:extLst>
 </p:presentation>
 </file>
 
@@ -163,7 +168,7 @@
           <p:cNvPr id="2" name="Title 1">
             <a:extLst>
               <a:ext uri="{FF2B5EF4-FFF2-40B4-BE49-F238E27FC236}">
-                <a16:creationId xmlns:a16="http://schemas.microsoft.com/office/drawing/2014/main" id="{47A57CC1-1348-4A76-AD92-02E2E06DE45E}"/>
+                <a16:creationId xmlns:a16="http://schemas.microsoft.com/office/drawing/2014/main" xmlns="" id="{47A57CC1-1348-4A76-AD92-02E2E06DE45E}"/>
               </a:ext>
             </a:extLst>
           </p:cNvPr>
@@ -200,7 +205,7 @@
           <p:cNvPr id="3" name="Subtitle 2">
             <a:extLst>
               <a:ext uri="{FF2B5EF4-FFF2-40B4-BE49-F238E27FC236}">
-                <a16:creationId xmlns:a16="http://schemas.microsoft.com/office/drawing/2014/main" id="{D407BAFC-D70C-49DE-AF92-81C8D53173C9}"/>
+                <a16:creationId xmlns:a16="http://schemas.microsoft.com/office/drawing/2014/main" xmlns="" id="{D407BAFC-D70C-49DE-AF92-81C8D53173C9}"/>
               </a:ext>
             </a:extLst>
           </p:cNvPr>
@@ -270,7 +275,7 @@
           <p:cNvPr id="4" name="Date Placeholder 3">
             <a:extLst>
               <a:ext uri="{FF2B5EF4-FFF2-40B4-BE49-F238E27FC236}">
-                <a16:creationId xmlns:a16="http://schemas.microsoft.com/office/drawing/2014/main" id="{2666DFEC-9DCA-4EB2-A4E7-52FC646255E9}"/>
+                <a16:creationId xmlns:a16="http://schemas.microsoft.com/office/drawing/2014/main" xmlns="" id="{2666DFEC-9DCA-4EB2-A4E7-52FC646255E9}"/>
               </a:ext>
             </a:extLst>
           </p:cNvPr>
@@ -288,7 +293,7 @@
           <a:p>
             <a:fld id="{A51D3C03-39B8-4933-B818-F90CC415D817}" type="datetimeFigureOut">
               <a:rPr lang="en-US" smtClean="0"/>
-              <a:t>2/1/2021</a:t>
+              <a:t>2/3/2021</a:t>
             </a:fld>
             <a:endParaRPr lang="en-US"/>
           </a:p>
@@ -299,7 +304,7 @@
           <p:cNvPr id="5" name="Footer Placeholder 4">
             <a:extLst>
               <a:ext uri="{FF2B5EF4-FFF2-40B4-BE49-F238E27FC236}">
-                <a16:creationId xmlns:a16="http://schemas.microsoft.com/office/drawing/2014/main" id="{86B99CB1-1251-452E-A8A1-B0487EA87B94}"/>
+                <a16:creationId xmlns:a16="http://schemas.microsoft.com/office/drawing/2014/main" xmlns="" id="{86B99CB1-1251-452E-A8A1-B0487EA87B94}"/>
               </a:ext>
             </a:extLst>
           </p:cNvPr>
@@ -324,7 +329,7 @@
           <p:cNvPr id="6" name="Slide Number Placeholder 5">
             <a:extLst>
               <a:ext uri="{FF2B5EF4-FFF2-40B4-BE49-F238E27FC236}">
-                <a16:creationId xmlns:a16="http://schemas.microsoft.com/office/drawing/2014/main" id="{87CC358D-F1CA-4887-B17A-60FAE88283F9}"/>
+                <a16:creationId xmlns:a16="http://schemas.microsoft.com/office/drawing/2014/main" xmlns="" id="{87CC358D-F1CA-4887-B17A-60FAE88283F9}"/>
               </a:ext>
             </a:extLst>
           </p:cNvPr>
@@ -383,7 +388,7 @@
           <p:cNvPr id="2" name="Title 1">
             <a:extLst>
               <a:ext uri="{FF2B5EF4-FFF2-40B4-BE49-F238E27FC236}">
-                <a16:creationId xmlns:a16="http://schemas.microsoft.com/office/drawing/2014/main" id="{71964C56-8DEF-47A8-A66B-B0809BADEEDF}"/>
+                <a16:creationId xmlns:a16="http://schemas.microsoft.com/office/drawing/2014/main" xmlns="" id="{71964C56-8DEF-47A8-A66B-B0809BADEEDF}"/>
               </a:ext>
             </a:extLst>
           </p:cNvPr>
@@ -411,7 +416,7 @@
           <p:cNvPr id="3" name="Vertical Text Placeholder 2">
             <a:extLst>
               <a:ext uri="{FF2B5EF4-FFF2-40B4-BE49-F238E27FC236}">
-                <a16:creationId xmlns:a16="http://schemas.microsoft.com/office/drawing/2014/main" id="{72A638AD-6548-4506-83C2-A865CB4F5756}"/>
+                <a16:creationId xmlns:a16="http://schemas.microsoft.com/office/drawing/2014/main" xmlns="" id="{72A638AD-6548-4506-83C2-A865CB4F5756}"/>
               </a:ext>
             </a:extLst>
           </p:cNvPr>
@@ -468,7 +473,7 @@
           <p:cNvPr id="4" name="Date Placeholder 3">
             <a:extLst>
               <a:ext uri="{FF2B5EF4-FFF2-40B4-BE49-F238E27FC236}">
-                <a16:creationId xmlns:a16="http://schemas.microsoft.com/office/drawing/2014/main" id="{94F729A1-F4B5-431F-A04F-DED8A3AF44A4}"/>
+                <a16:creationId xmlns:a16="http://schemas.microsoft.com/office/drawing/2014/main" xmlns="" id="{94F729A1-F4B5-431F-A04F-DED8A3AF44A4}"/>
               </a:ext>
             </a:extLst>
           </p:cNvPr>
@@ -486,7 +491,7 @@
           <a:p>
             <a:fld id="{A51D3C03-39B8-4933-B818-F90CC415D817}" type="datetimeFigureOut">
               <a:rPr lang="en-US" smtClean="0"/>
-              <a:t>2/1/2021</a:t>
+              <a:t>2/3/2021</a:t>
             </a:fld>
             <a:endParaRPr lang="en-US"/>
           </a:p>
@@ -497,7 +502,7 @@
           <p:cNvPr id="5" name="Footer Placeholder 4">
             <a:extLst>
               <a:ext uri="{FF2B5EF4-FFF2-40B4-BE49-F238E27FC236}">
-                <a16:creationId xmlns:a16="http://schemas.microsoft.com/office/drawing/2014/main" id="{215DB6D5-2605-4EDE-9A6B-390BFED549B1}"/>
+                <a16:creationId xmlns:a16="http://schemas.microsoft.com/office/drawing/2014/main" xmlns="" id="{215DB6D5-2605-4EDE-9A6B-390BFED549B1}"/>
               </a:ext>
             </a:extLst>
           </p:cNvPr>
@@ -522,7 +527,7 @@
           <p:cNvPr id="6" name="Slide Number Placeholder 5">
             <a:extLst>
               <a:ext uri="{FF2B5EF4-FFF2-40B4-BE49-F238E27FC236}">
-                <a16:creationId xmlns:a16="http://schemas.microsoft.com/office/drawing/2014/main" id="{DFF5D116-5940-48B0-B7A0-DF9BEB19FC95}"/>
+                <a16:creationId xmlns:a16="http://schemas.microsoft.com/office/drawing/2014/main" xmlns="" id="{DFF5D116-5940-48B0-B7A0-DF9BEB19FC95}"/>
               </a:ext>
             </a:extLst>
           </p:cNvPr>
@@ -581,7 +586,7 @@
           <p:cNvPr id="2" name="Vertical Title 1">
             <a:extLst>
               <a:ext uri="{FF2B5EF4-FFF2-40B4-BE49-F238E27FC236}">
-                <a16:creationId xmlns:a16="http://schemas.microsoft.com/office/drawing/2014/main" id="{46579A1D-A679-4532-ACAC-88D485AEA85E}"/>
+                <a16:creationId xmlns:a16="http://schemas.microsoft.com/office/drawing/2014/main" xmlns="" id="{46579A1D-A679-4532-ACAC-88D485AEA85E}"/>
               </a:ext>
             </a:extLst>
           </p:cNvPr>
@@ -614,7 +619,7 @@
           <p:cNvPr id="3" name="Vertical Text Placeholder 2">
             <a:extLst>
               <a:ext uri="{FF2B5EF4-FFF2-40B4-BE49-F238E27FC236}">
-                <a16:creationId xmlns:a16="http://schemas.microsoft.com/office/drawing/2014/main" id="{B4317457-C381-4B01-82EB-8BBCC374758D}"/>
+                <a16:creationId xmlns:a16="http://schemas.microsoft.com/office/drawing/2014/main" xmlns="" id="{B4317457-C381-4B01-82EB-8BBCC374758D}"/>
               </a:ext>
             </a:extLst>
           </p:cNvPr>
@@ -676,7 +681,7 @@
           <p:cNvPr id="4" name="Date Placeholder 3">
             <a:extLst>
               <a:ext uri="{FF2B5EF4-FFF2-40B4-BE49-F238E27FC236}">
-                <a16:creationId xmlns:a16="http://schemas.microsoft.com/office/drawing/2014/main" id="{D89830DC-71B8-4BD2-B549-1A3A872E496B}"/>
+                <a16:creationId xmlns:a16="http://schemas.microsoft.com/office/drawing/2014/main" xmlns="" id="{D89830DC-71B8-4BD2-B549-1A3A872E496B}"/>
               </a:ext>
             </a:extLst>
           </p:cNvPr>
@@ -694,7 +699,7 @@
           <a:p>
             <a:fld id="{A51D3C03-39B8-4933-B818-F90CC415D817}" type="datetimeFigureOut">
               <a:rPr lang="en-US" smtClean="0"/>
-              <a:t>2/1/2021</a:t>
+              <a:t>2/3/2021</a:t>
             </a:fld>
             <a:endParaRPr lang="en-US"/>
           </a:p>
@@ -705,7 +710,7 @@
           <p:cNvPr id="5" name="Footer Placeholder 4">
             <a:extLst>
               <a:ext uri="{FF2B5EF4-FFF2-40B4-BE49-F238E27FC236}">
-                <a16:creationId xmlns:a16="http://schemas.microsoft.com/office/drawing/2014/main" id="{D65BD26B-B018-4DFB-BBF3-1FB8B167646E}"/>
+                <a16:creationId xmlns:a16="http://schemas.microsoft.com/office/drawing/2014/main" xmlns="" id="{D65BD26B-B018-4DFB-BBF3-1FB8B167646E}"/>
               </a:ext>
             </a:extLst>
           </p:cNvPr>
@@ -730,7 +735,7 @@
           <p:cNvPr id="6" name="Slide Number Placeholder 5">
             <a:extLst>
               <a:ext uri="{FF2B5EF4-FFF2-40B4-BE49-F238E27FC236}">
-                <a16:creationId xmlns:a16="http://schemas.microsoft.com/office/drawing/2014/main" id="{4C189D68-8CE8-40C8-B7DD-22FE3890DC1A}"/>
+                <a16:creationId xmlns:a16="http://schemas.microsoft.com/office/drawing/2014/main" xmlns="" id="{4C189D68-8CE8-40C8-B7DD-22FE3890DC1A}"/>
               </a:ext>
             </a:extLst>
           </p:cNvPr>
@@ -789,7 +794,7 @@
           <p:cNvPr id="2" name="Title 1">
             <a:extLst>
               <a:ext uri="{FF2B5EF4-FFF2-40B4-BE49-F238E27FC236}">
-                <a16:creationId xmlns:a16="http://schemas.microsoft.com/office/drawing/2014/main" id="{876C338A-6CA6-4ACB-8C16-C40355026EBB}"/>
+                <a16:creationId xmlns:a16="http://schemas.microsoft.com/office/drawing/2014/main" xmlns="" id="{876C338A-6CA6-4ACB-8C16-C40355026EBB}"/>
               </a:ext>
             </a:extLst>
           </p:cNvPr>
@@ -817,7 +822,7 @@
           <p:cNvPr id="3" name="Content Placeholder 2">
             <a:extLst>
               <a:ext uri="{FF2B5EF4-FFF2-40B4-BE49-F238E27FC236}">
-                <a16:creationId xmlns:a16="http://schemas.microsoft.com/office/drawing/2014/main" id="{01E7D3D9-52D1-452D-AD32-A3819FA367BF}"/>
+                <a16:creationId xmlns:a16="http://schemas.microsoft.com/office/drawing/2014/main" xmlns="" id="{01E7D3D9-52D1-452D-AD32-A3819FA367BF}"/>
               </a:ext>
             </a:extLst>
           </p:cNvPr>
@@ -874,7 +879,7 @@
           <p:cNvPr id="4" name="Date Placeholder 3">
             <a:extLst>
               <a:ext uri="{FF2B5EF4-FFF2-40B4-BE49-F238E27FC236}">
-                <a16:creationId xmlns:a16="http://schemas.microsoft.com/office/drawing/2014/main" id="{986F775C-4F09-46A9-BE23-74A42B32CB57}"/>
+                <a16:creationId xmlns:a16="http://schemas.microsoft.com/office/drawing/2014/main" xmlns="" id="{986F775C-4F09-46A9-BE23-74A42B32CB57}"/>
               </a:ext>
             </a:extLst>
           </p:cNvPr>
@@ -892,7 +897,7 @@
           <a:p>
             <a:fld id="{A51D3C03-39B8-4933-B818-F90CC415D817}" type="datetimeFigureOut">
               <a:rPr lang="en-US" smtClean="0"/>
-              <a:t>2/1/2021</a:t>
+              <a:t>2/3/2021</a:t>
             </a:fld>
             <a:endParaRPr lang="en-US"/>
           </a:p>
@@ -903,7 +908,7 @@
           <p:cNvPr id="5" name="Footer Placeholder 4">
             <a:extLst>
               <a:ext uri="{FF2B5EF4-FFF2-40B4-BE49-F238E27FC236}">
-                <a16:creationId xmlns:a16="http://schemas.microsoft.com/office/drawing/2014/main" id="{EA492A3E-0F26-4A1B-BDEE-B3DA2873135A}"/>
+                <a16:creationId xmlns:a16="http://schemas.microsoft.com/office/drawing/2014/main" xmlns="" id="{EA492A3E-0F26-4A1B-BDEE-B3DA2873135A}"/>
               </a:ext>
             </a:extLst>
           </p:cNvPr>
@@ -928,7 +933,7 @@
           <p:cNvPr id="6" name="Slide Number Placeholder 5">
             <a:extLst>
               <a:ext uri="{FF2B5EF4-FFF2-40B4-BE49-F238E27FC236}">
-                <a16:creationId xmlns:a16="http://schemas.microsoft.com/office/drawing/2014/main" id="{05AFA2C7-2988-4994-BCC9-0B08AF2B9080}"/>
+                <a16:creationId xmlns:a16="http://schemas.microsoft.com/office/drawing/2014/main" xmlns="" id="{05AFA2C7-2988-4994-BCC9-0B08AF2B9080}"/>
               </a:ext>
             </a:extLst>
           </p:cNvPr>
@@ -987,7 +992,7 @@
           <p:cNvPr id="2" name="Title 1">
             <a:extLst>
               <a:ext uri="{FF2B5EF4-FFF2-40B4-BE49-F238E27FC236}">
-                <a16:creationId xmlns:a16="http://schemas.microsoft.com/office/drawing/2014/main" id="{4C8F62AD-435D-4505-B62D-A3A995ECCC31}"/>
+                <a16:creationId xmlns:a16="http://schemas.microsoft.com/office/drawing/2014/main" xmlns="" id="{4C8F62AD-435D-4505-B62D-A3A995ECCC31}"/>
               </a:ext>
             </a:extLst>
           </p:cNvPr>
@@ -1024,7 +1029,7 @@
           <p:cNvPr id="3" name="Text Placeholder 2">
             <a:extLst>
               <a:ext uri="{FF2B5EF4-FFF2-40B4-BE49-F238E27FC236}">
-                <a16:creationId xmlns:a16="http://schemas.microsoft.com/office/drawing/2014/main" id="{59A6084C-F372-4856-9558-CF416C1FD5EA}"/>
+                <a16:creationId xmlns:a16="http://schemas.microsoft.com/office/drawing/2014/main" xmlns="" id="{59A6084C-F372-4856-9558-CF416C1FD5EA}"/>
               </a:ext>
             </a:extLst>
           </p:cNvPr>
@@ -1149,7 +1154,7 @@
           <p:cNvPr id="4" name="Date Placeholder 3">
             <a:extLst>
               <a:ext uri="{FF2B5EF4-FFF2-40B4-BE49-F238E27FC236}">
-                <a16:creationId xmlns:a16="http://schemas.microsoft.com/office/drawing/2014/main" id="{3B039A62-A899-46F1-89C4-C69AB01A7B96}"/>
+                <a16:creationId xmlns:a16="http://schemas.microsoft.com/office/drawing/2014/main" xmlns="" id="{3B039A62-A899-46F1-89C4-C69AB01A7B96}"/>
               </a:ext>
             </a:extLst>
           </p:cNvPr>
@@ -1167,7 +1172,7 @@
           <a:p>
             <a:fld id="{A51D3C03-39B8-4933-B818-F90CC415D817}" type="datetimeFigureOut">
               <a:rPr lang="en-US" smtClean="0"/>
-              <a:t>2/1/2021</a:t>
+              <a:t>2/3/2021</a:t>
             </a:fld>
             <a:endParaRPr lang="en-US"/>
           </a:p>
@@ -1178,7 +1183,7 @@
           <p:cNvPr id="5" name="Footer Placeholder 4">
             <a:extLst>
               <a:ext uri="{FF2B5EF4-FFF2-40B4-BE49-F238E27FC236}">
-                <a16:creationId xmlns:a16="http://schemas.microsoft.com/office/drawing/2014/main" id="{9869DBA0-E4C4-457A-9F9A-F23C275EB04F}"/>
+                <a16:creationId xmlns:a16="http://schemas.microsoft.com/office/drawing/2014/main" xmlns="" id="{9869DBA0-E4C4-457A-9F9A-F23C275EB04F}"/>
               </a:ext>
             </a:extLst>
           </p:cNvPr>
@@ -1203,7 +1208,7 @@
           <p:cNvPr id="6" name="Slide Number Placeholder 5">
             <a:extLst>
               <a:ext uri="{FF2B5EF4-FFF2-40B4-BE49-F238E27FC236}">
-                <a16:creationId xmlns:a16="http://schemas.microsoft.com/office/drawing/2014/main" id="{A27BAACD-61EE-4416-8C07-3E447E1542B7}"/>
+                <a16:creationId xmlns:a16="http://schemas.microsoft.com/office/drawing/2014/main" xmlns="" id="{A27BAACD-61EE-4416-8C07-3E447E1542B7}"/>
               </a:ext>
             </a:extLst>
           </p:cNvPr>
@@ -1262,7 +1267,7 @@
           <p:cNvPr id="2" name="Title 1">
             <a:extLst>
               <a:ext uri="{FF2B5EF4-FFF2-40B4-BE49-F238E27FC236}">
-                <a16:creationId xmlns:a16="http://schemas.microsoft.com/office/drawing/2014/main" id="{220DD72B-83B9-476D-987A-67F023C78C02}"/>
+                <a16:creationId xmlns:a16="http://schemas.microsoft.com/office/drawing/2014/main" xmlns="" id="{220DD72B-83B9-476D-987A-67F023C78C02}"/>
               </a:ext>
             </a:extLst>
           </p:cNvPr>
@@ -1290,7 +1295,7 @@
           <p:cNvPr id="3" name="Content Placeholder 2">
             <a:extLst>
               <a:ext uri="{FF2B5EF4-FFF2-40B4-BE49-F238E27FC236}">
-                <a16:creationId xmlns:a16="http://schemas.microsoft.com/office/drawing/2014/main" id="{73A30ACF-4250-450C-84EA-401072FB8749}"/>
+                <a16:creationId xmlns:a16="http://schemas.microsoft.com/office/drawing/2014/main" xmlns="" id="{73A30ACF-4250-450C-84EA-401072FB8749}"/>
               </a:ext>
             </a:extLst>
           </p:cNvPr>
@@ -1352,7 +1357,7 @@
           <p:cNvPr id="4" name="Content Placeholder 3">
             <a:extLst>
               <a:ext uri="{FF2B5EF4-FFF2-40B4-BE49-F238E27FC236}">
-                <a16:creationId xmlns:a16="http://schemas.microsoft.com/office/drawing/2014/main" id="{502FABC9-B86E-4F42-8819-F33B2BD832B4}"/>
+                <a16:creationId xmlns:a16="http://schemas.microsoft.com/office/drawing/2014/main" xmlns="" id="{502FABC9-B86E-4F42-8819-F33B2BD832B4}"/>
               </a:ext>
             </a:extLst>
           </p:cNvPr>
@@ -1414,7 +1419,7 @@
           <p:cNvPr id="5" name="Date Placeholder 4">
             <a:extLst>
               <a:ext uri="{FF2B5EF4-FFF2-40B4-BE49-F238E27FC236}">
-                <a16:creationId xmlns:a16="http://schemas.microsoft.com/office/drawing/2014/main" id="{B90F1971-0A10-4397-A0E7-FCAE8E70FF7A}"/>
+                <a16:creationId xmlns:a16="http://schemas.microsoft.com/office/drawing/2014/main" xmlns="" id="{B90F1971-0A10-4397-A0E7-FCAE8E70FF7A}"/>
               </a:ext>
             </a:extLst>
           </p:cNvPr>
@@ -1432,7 +1437,7 @@
           <a:p>
             <a:fld id="{A51D3C03-39B8-4933-B818-F90CC415D817}" type="datetimeFigureOut">
               <a:rPr lang="en-US" smtClean="0"/>
-              <a:t>2/1/2021</a:t>
+              <a:t>2/3/2021</a:t>
             </a:fld>
             <a:endParaRPr lang="en-US"/>
           </a:p>
@@ -1443,7 +1448,7 @@
           <p:cNvPr id="6" name="Footer Placeholder 5">
             <a:extLst>
               <a:ext uri="{FF2B5EF4-FFF2-40B4-BE49-F238E27FC236}">
-                <a16:creationId xmlns:a16="http://schemas.microsoft.com/office/drawing/2014/main" id="{965B94A5-41D8-4FED-90FB-AEA017B8E525}"/>
+                <a16:creationId xmlns:a16="http://schemas.microsoft.com/office/drawing/2014/main" xmlns="" id="{965B94A5-41D8-4FED-90FB-AEA017B8E525}"/>
               </a:ext>
             </a:extLst>
           </p:cNvPr>
@@ -1468,7 +1473,7 @@
           <p:cNvPr id="7" name="Slide Number Placeholder 6">
             <a:extLst>
               <a:ext uri="{FF2B5EF4-FFF2-40B4-BE49-F238E27FC236}">
-                <a16:creationId xmlns:a16="http://schemas.microsoft.com/office/drawing/2014/main" id="{A4D39651-60CB-4315-9FEB-3AE5DC5E3D4C}"/>
+                <a16:creationId xmlns:a16="http://schemas.microsoft.com/office/drawing/2014/main" xmlns="" id="{A4D39651-60CB-4315-9FEB-3AE5DC5E3D4C}"/>
               </a:ext>
             </a:extLst>
           </p:cNvPr>
@@ -1527,7 +1532,7 @@
           <p:cNvPr id="2" name="Title 1">
             <a:extLst>
               <a:ext uri="{FF2B5EF4-FFF2-40B4-BE49-F238E27FC236}">
-                <a16:creationId xmlns:a16="http://schemas.microsoft.com/office/drawing/2014/main" id="{072002E0-E3DB-42B0-9CB5-430E436B32FA}"/>
+                <a16:creationId xmlns:a16="http://schemas.microsoft.com/office/drawing/2014/main" xmlns="" id="{072002E0-E3DB-42B0-9CB5-430E436B32FA}"/>
               </a:ext>
             </a:extLst>
           </p:cNvPr>
@@ -1560,7 +1565,7 @@
           <p:cNvPr id="3" name="Text Placeholder 2">
             <a:extLst>
               <a:ext uri="{FF2B5EF4-FFF2-40B4-BE49-F238E27FC236}">
-                <a16:creationId xmlns:a16="http://schemas.microsoft.com/office/drawing/2014/main" id="{5AE08072-9611-473C-8515-C891807B50FA}"/>
+                <a16:creationId xmlns:a16="http://schemas.microsoft.com/office/drawing/2014/main" xmlns="" id="{5AE08072-9611-473C-8515-C891807B50FA}"/>
               </a:ext>
             </a:extLst>
           </p:cNvPr>
@@ -1631,7 +1636,7 @@
           <p:cNvPr id="4" name="Content Placeholder 3">
             <a:extLst>
               <a:ext uri="{FF2B5EF4-FFF2-40B4-BE49-F238E27FC236}">
-                <a16:creationId xmlns:a16="http://schemas.microsoft.com/office/drawing/2014/main" id="{B51509BD-8E3C-4B0E-A578-AC1D675DF6CC}"/>
+                <a16:creationId xmlns:a16="http://schemas.microsoft.com/office/drawing/2014/main" xmlns="" id="{B51509BD-8E3C-4B0E-A578-AC1D675DF6CC}"/>
               </a:ext>
             </a:extLst>
           </p:cNvPr>
@@ -1693,7 +1698,7 @@
           <p:cNvPr id="5" name="Text Placeholder 4">
             <a:extLst>
               <a:ext uri="{FF2B5EF4-FFF2-40B4-BE49-F238E27FC236}">
-                <a16:creationId xmlns:a16="http://schemas.microsoft.com/office/drawing/2014/main" id="{92C0E66C-719A-4146-A1AB-5D6F246BE6C6}"/>
+                <a16:creationId xmlns:a16="http://schemas.microsoft.com/office/drawing/2014/main" xmlns="" id="{92C0E66C-719A-4146-A1AB-5D6F246BE6C6}"/>
               </a:ext>
             </a:extLst>
           </p:cNvPr>
@@ -1764,7 +1769,7 @@
           <p:cNvPr id="6" name="Content Placeholder 5">
             <a:extLst>
               <a:ext uri="{FF2B5EF4-FFF2-40B4-BE49-F238E27FC236}">
-                <a16:creationId xmlns:a16="http://schemas.microsoft.com/office/drawing/2014/main" id="{79388056-0EE8-4B17-9B87-243409AA4F6A}"/>
+                <a16:creationId xmlns:a16="http://schemas.microsoft.com/office/drawing/2014/main" xmlns="" id="{79388056-0EE8-4B17-9B87-243409AA4F6A}"/>
               </a:ext>
             </a:extLst>
           </p:cNvPr>
@@ -1826,7 +1831,7 @@
           <p:cNvPr id="7" name="Date Placeholder 6">
             <a:extLst>
               <a:ext uri="{FF2B5EF4-FFF2-40B4-BE49-F238E27FC236}">
-                <a16:creationId xmlns:a16="http://schemas.microsoft.com/office/drawing/2014/main" id="{045E0641-6C75-4351-9B9A-B0835E56F284}"/>
+                <a16:creationId xmlns:a16="http://schemas.microsoft.com/office/drawing/2014/main" xmlns="" id="{045E0641-6C75-4351-9B9A-B0835E56F284}"/>
               </a:ext>
             </a:extLst>
           </p:cNvPr>
@@ -1844,7 +1849,7 @@
           <a:p>
             <a:fld id="{A51D3C03-39B8-4933-B818-F90CC415D817}" type="datetimeFigureOut">
               <a:rPr lang="en-US" smtClean="0"/>
-              <a:t>2/1/2021</a:t>
+              <a:t>2/3/2021</a:t>
             </a:fld>
             <a:endParaRPr lang="en-US"/>
           </a:p>
@@ -1855,7 +1860,7 @@
           <p:cNvPr id="8" name="Footer Placeholder 7">
             <a:extLst>
               <a:ext uri="{FF2B5EF4-FFF2-40B4-BE49-F238E27FC236}">
-                <a16:creationId xmlns:a16="http://schemas.microsoft.com/office/drawing/2014/main" id="{9E9A82E3-DAAE-41F2-A4E9-3FC7074FB1BD}"/>
+                <a16:creationId xmlns:a16="http://schemas.microsoft.com/office/drawing/2014/main" xmlns="" id="{9E9A82E3-DAAE-41F2-A4E9-3FC7074FB1BD}"/>
               </a:ext>
             </a:extLst>
           </p:cNvPr>
@@ -1880,7 +1885,7 @@
           <p:cNvPr id="9" name="Slide Number Placeholder 8">
             <a:extLst>
               <a:ext uri="{FF2B5EF4-FFF2-40B4-BE49-F238E27FC236}">
-                <a16:creationId xmlns:a16="http://schemas.microsoft.com/office/drawing/2014/main" id="{C8F7D22E-9710-4865-9D5A-F93585B40F21}"/>
+                <a16:creationId xmlns:a16="http://schemas.microsoft.com/office/drawing/2014/main" xmlns="" id="{C8F7D22E-9710-4865-9D5A-F93585B40F21}"/>
               </a:ext>
             </a:extLst>
           </p:cNvPr>
@@ -1939,7 +1944,7 @@
           <p:cNvPr id="2" name="Title 1">
             <a:extLst>
               <a:ext uri="{FF2B5EF4-FFF2-40B4-BE49-F238E27FC236}">
-                <a16:creationId xmlns:a16="http://schemas.microsoft.com/office/drawing/2014/main" id="{B08C3FC7-A630-4BDE-B277-7D6FE62788B0}"/>
+                <a16:creationId xmlns:a16="http://schemas.microsoft.com/office/drawing/2014/main" xmlns="" id="{B08C3FC7-A630-4BDE-B277-7D6FE62788B0}"/>
               </a:ext>
             </a:extLst>
           </p:cNvPr>
@@ -1967,7 +1972,7 @@
           <p:cNvPr id="3" name="Date Placeholder 2">
             <a:extLst>
               <a:ext uri="{FF2B5EF4-FFF2-40B4-BE49-F238E27FC236}">
-                <a16:creationId xmlns:a16="http://schemas.microsoft.com/office/drawing/2014/main" id="{965D4443-B74C-4D8A-AA5E-50F0017B3EBB}"/>
+                <a16:creationId xmlns:a16="http://schemas.microsoft.com/office/drawing/2014/main" xmlns="" id="{965D4443-B74C-4D8A-AA5E-50F0017B3EBB}"/>
               </a:ext>
             </a:extLst>
           </p:cNvPr>
@@ -1985,7 +1990,7 @@
           <a:p>
             <a:fld id="{A51D3C03-39B8-4933-B818-F90CC415D817}" type="datetimeFigureOut">
               <a:rPr lang="en-US" smtClean="0"/>
-              <a:t>2/1/2021</a:t>
+              <a:t>2/3/2021</a:t>
             </a:fld>
             <a:endParaRPr lang="en-US"/>
           </a:p>
@@ -1996,7 +2001,7 @@
           <p:cNvPr id="4" name="Footer Placeholder 3">
             <a:extLst>
               <a:ext uri="{FF2B5EF4-FFF2-40B4-BE49-F238E27FC236}">
-                <a16:creationId xmlns:a16="http://schemas.microsoft.com/office/drawing/2014/main" id="{7B4C72E9-16F5-4244-BD3C-5204E6068891}"/>
+                <a16:creationId xmlns:a16="http://schemas.microsoft.com/office/drawing/2014/main" xmlns="" id="{7B4C72E9-16F5-4244-BD3C-5204E6068891}"/>
               </a:ext>
             </a:extLst>
           </p:cNvPr>
@@ -2021,7 +2026,7 @@
           <p:cNvPr id="5" name="Slide Number Placeholder 4">
             <a:extLst>
               <a:ext uri="{FF2B5EF4-FFF2-40B4-BE49-F238E27FC236}">
-                <a16:creationId xmlns:a16="http://schemas.microsoft.com/office/drawing/2014/main" id="{547F59B8-FAC3-40F4-A2C9-9D6A2616B291}"/>
+                <a16:creationId xmlns:a16="http://schemas.microsoft.com/office/drawing/2014/main" xmlns="" id="{547F59B8-FAC3-40F4-A2C9-9D6A2616B291}"/>
               </a:ext>
             </a:extLst>
           </p:cNvPr>
@@ -2080,7 +2085,7 @@
           <p:cNvPr id="2" name="Date Placeholder 1">
             <a:extLst>
               <a:ext uri="{FF2B5EF4-FFF2-40B4-BE49-F238E27FC236}">
-                <a16:creationId xmlns:a16="http://schemas.microsoft.com/office/drawing/2014/main" id="{B7E7C610-29FD-4F3C-B57D-FBC1E11E9509}"/>
+                <a16:creationId xmlns:a16="http://schemas.microsoft.com/office/drawing/2014/main" xmlns="" id="{B7E7C610-29FD-4F3C-B57D-FBC1E11E9509}"/>
               </a:ext>
             </a:extLst>
           </p:cNvPr>
@@ -2098,7 +2103,7 @@
           <a:p>
             <a:fld id="{A51D3C03-39B8-4933-B818-F90CC415D817}" type="datetimeFigureOut">
               <a:rPr lang="en-US" smtClean="0"/>
-              <a:t>2/1/2021</a:t>
+              <a:t>2/3/2021</a:t>
             </a:fld>
             <a:endParaRPr lang="en-US"/>
           </a:p>
@@ -2109,7 +2114,7 @@
           <p:cNvPr id="3" name="Footer Placeholder 2">
             <a:extLst>
               <a:ext uri="{FF2B5EF4-FFF2-40B4-BE49-F238E27FC236}">
-                <a16:creationId xmlns:a16="http://schemas.microsoft.com/office/drawing/2014/main" id="{D46C1E17-6140-4464-9326-2BEAC0D3BEF6}"/>
+                <a16:creationId xmlns:a16="http://schemas.microsoft.com/office/drawing/2014/main" xmlns="" id="{D46C1E17-6140-4464-9326-2BEAC0D3BEF6}"/>
               </a:ext>
             </a:extLst>
           </p:cNvPr>
@@ -2134,7 +2139,7 @@
           <p:cNvPr id="4" name="Slide Number Placeholder 3">
             <a:extLst>
               <a:ext uri="{FF2B5EF4-FFF2-40B4-BE49-F238E27FC236}">
-                <a16:creationId xmlns:a16="http://schemas.microsoft.com/office/drawing/2014/main" id="{F35E25FB-7089-4B9B-9670-4E366BEBC7AE}"/>
+                <a16:creationId xmlns:a16="http://schemas.microsoft.com/office/drawing/2014/main" xmlns="" id="{F35E25FB-7089-4B9B-9670-4E366BEBC7AE}"/>
               </a:ext>
             </a:extLst>
           </p:cNvPr>
@@ -2193,7 +2198,7 @@
           <p:cNvPr id="2" name="Title 1">
             <a:extLst>
               <a:ext uri="{FF2B5EF4-FFF2-40B4-BE49-F238E27FC236}">
-                <a16:creationId xmlns:a16="http://schemas.microsoft.com/office/drawing/2014/main" id="{07A1F60E-EEA0-4341-AE4F-BE659E71A953}"/>
+                <a16:creationId xmlns:a16="http://schemas.microsoft.com/office/drawing/2014/main" xmlns="" id="{07A1F60E-EEA0-4341-AE4F-BE659E71A953}"/>
               </a:ext>
             </a:extLst>
           </p:cNvPr>
@@ -2230,7 +2235,7 @@
           <p:cNvPr id="3" name="Content Placeholder 2">
             <a:extLst>
               <a:ext uri="{FF2B5EF4-FFF2-40B4-BE49-F238E27FC236}">
-                <a16:creationId xmlns:a16="http://schemas.microsoft.com/office/drawing/2014/main" id="{605A43E6-D09D-4B71-8D5B-1C50BDD8432B}"/>
+                <a16:creationId xmlns:a16="http://schemas.microsoft.com/office/drawing/2014/main" xmlns="" id="{605A43E6-D09D-4B71-8D5B-1C50BDD8432B}"/>
               </a:ext>
             </a:extLst>
           </p:cNvPr>
@@ -2320,7 +2325,7 @@
           <p:cNvPr id="4" name="Text Placeholder 3">
             <a:extLst>
               <a:ext uri="{FF2B5EF4-FFF2-40B4-BE49-F238E27FC236}">
-                <a16:creationId xmlns:a16="http://schemas.microsoft.com/office/drawing/2014/main" id="{67835C4B-FFE5-480A-ADE7-59E7DE3305E3}"/>
+                <a16:creationId xmlns:a16="http://schemas.microsoft.com/office/drawing/2014/main" xmlns="" id="{67835C4B-FFE5-480A-ADE7-59E7DE3305E3}"/>
               </a:ext>
             </a:extLst>
           </p:cNvPr>
@@ -2391,7 +2396,7 @@
           <p:cNvPr id="5" name="Date Placeholder 4">
             <a:extLst>
               <a:ext uri="{FF2B5EF4-FFF2-40B4-BE49-F238E27FC236}">
-                <a16:creationId xmlns:a16="http://schemas.microsoft.com/office/drawing/2014/main" id="{A82F3219-CC0C-441E-B4C4-828852BE1508}"/>
+                <a16:creationId xmlns:a16="http://schemas.microsoft.com/office/drawing/2014/main" xmlns="" id="{A82F3219-CC0C-441E-B4C4-828852BE1508}"/>
               </a:ext>
             </a:extLst>
           </p:cNvPr>
@@ -2409,7 +2414,7 @@
           <a:p>
             <a:fld id="{A51D3C03-39B8-4933-B818-F90CC415D817}" type="datetimeFigureOut">
               <a:rPr lang="en-US" smtClean="0"/>
-              <a:t>2/1/2021</a:t>
+              <a:t>2/3/2021</a:t>
             </a:fld>
             <a:endParaRPr lang="en-US"/>
           </a:p>
@@ -2420,7 +2425,7 @@
           <p:cNvPr id="6" name="Footer Placeholder 5">
             <a:extLst>
               <a:ext uri="{FF2B5EF4-FFF2-40B4-BE49-F238E27FC236}">
-                <a16:creationId xmlns:a16="http://schemas.microsoft.com/office/drawing/2014/main" id="{B45AEAA7-4579-48A8-BBE9-77FABB88B1F9}"/>
+                <a16:creationId xmlns:a16="http://schemas.microsoft.com/office/drawing/2014/main" xmlns="" id="{B45AEAA7-4579-48A8-BBE9-77FABB88B1F9}"/>
               </a:ext>
             </a:extLst>
           </p:cNvPr>
@@ -2445,7 +2450,7 @@
           <p:cNvPr id="7" name="Slide Number Placeholder 6">
             <a:extLst>
               <a:ext uri="{FF2B5EF4-FFF2-40B4-BE49-F238E27FC236}">
-                <a16:creationId xmlns:a16="http://schemas.microsoft.com/office/drawing/2014/main" id="{E8E18020-050D-44B9-AF91-F02932AAFBAC}"/>
+                <a16:creationId xmlns:a16="http://schemas.microsoft.com/office/drawing/2014/main" xmlns="" id="{E8E18020-050D-44B9-AF91-F02932AAFBAC}"/>
               </a:ext>
             </a:extLst>
           </p:cNvPr>
@@ -2504,7 +2509,7 @@
           <p:cNvPr id="2" name="Title 1">
             <a:extLst>
               <a:ext uri="{FF2B5EF4-FFF2-40B4-BE49-F238E27FC236}">
-                <a16:creationId xmlns:a16="http://schemas.microsoft.com/office/drawing/2014/main" id="{7B8C8EEE-41D7-40BB-AA7D-AD1EF3E45174}"/>
+                <a16:creationId xmlns:a16="http://schemas.microsoft.com/office/drawing/2014/main" xmlns="" id="{7B8C8EEE-41D7-40BB-AA7D-AD1EF3E45174}"/>
               </a:ext>
             </a:extLst>
           </p:cNvPr>
@@ -2541,7 +2546,7 @@
           <p:cNvPr id="3" name="Picture Placeholder 2">
             <a:extLst>
               <a:ext uri="{FF2B5EF4-FFF2-40B4-BE49-F238E27FC236}">
-                <a16:creationId xmlns:a16="http://schemas.microsoft.com/office/drawing/2014/main" id="{BC568EC0-A830-4BD8-A2EC-9DFC2E5C75BD}"/>
+                <a16:creationId xmlns:a16="http://schemas.microsoft.com/office/drawing/2014/main" xmlns="" id="{BC568EC0-A830-4BD8-A2EC-9DFC2E5C75BD}"/>
               </a:ext>
             </a:extLst>
           </p:cNvPr>
@@ -2608,7 +2613,7 @@
           <p:cNvPr id="4" name="Text Placeholder 3">
             <a:extLst>
               <a:ext uri="{FF2B5EF4-FFF2-40B4-BE49-F238E27FC236}">
-                <a16:creationId xmlns:a16="http://schemas.microsoft.com/office/drawing/2014/main" id="{15CDBF85-F82E-4227-9244-E81089576FD3}"/>
+                <a16:creationId xmlns:a16="http://schemas.microsoft.com/office/drawing/2014/main" xmlns="" id="{15CDBF85-F82E-4227-9244-E81089576FD3}"/>
               </a:ext>
             </a:extLst>
           </p:cNvPr>
@@ -2679,7 +2684,7 @@
           <p:cNvPr id="5" name="Date Placeholder 4">
             <a:extLst>
               <a:ext uri="{FF2B5EF4-FFF2-40B4-BE49-F238E27FC236}">
-                <a16:creationId xmlns:a16="http://schemas.microsoft.com/office/drawing/2014/main" id="{2A75849D-FB3A-47E1-BACA-C1CC3D0923F3}"/>
+                <a16:creationId xmlns:a16="http://schemas.microsoft.com/office/drawing/2014/main" xmlns="" id="{2A75849D-FB3A-47E1-BACA-C1CC3D0923F3}"/>
               </a:ext>
             </a:extLst>
           </p:cNvPr>
@@ -2697,7 +2702,7 @@
           <a:p>
             <a:fld id="{A51D3C03-39B8-4933-B818-F90CC415D817}" type="datetimeFigureOut">
               <a:rPr lang="en-US" smtClean="0"/>
-              <a:t>2/1/2021</a:t>
+              <a:t>2/3/2021</a:t>
             </a:fld>
             <a:endParaRPr lang="en-US"/>
           </a:p>
@@ -2708,7 +2713,7 @@
           <p:cNvPr id="6" name="Footer Placeholder 5">
             <a:extLst>
               <a:ext uri="{FF2B5EF4-FFF2-40B4-BE49-F238E27FC236}">
-                <a16:creationId xmlns:a16="http://schemas.microsoft.com/office/drawing/2014/main" id="{4736304D-4185-4048-9E5A-C969AD40460E}"/>
+                <a16:creationId xmlns:a16="http://schemas.microsoft.com/office/drawing/2014/main" xmlns="" id="{4736304D-4185-4048-9E5A-C969AD40460E}"/>
               </a:ext>
             </a:extLst>
           </p:cNvPr>
@@ -2733,7 +2738,7 @@
           <p:cNvPr id="7" name="Slide Number Placeholder 6">
             <a:extLst>
               <a:ext uri="{FF2B5EF4-FFF2-40B4-BE49-F238E27FC236}">
-                <a16:creationId xmlns:a16="http://schemas.microsoft.com/office/drawing/2014/main" id="{C0BB9A56-3FEB-453D-9F8A-8A13A0D3EB72}"/>
+                <a16:creationId xmlns:a16="http://schemas.microsoft.com/office/drawing/2014/main" xmlns="" id="{C0BB9A56-3FEB-453D-9F8A-8A13A0D3EB72}"/>
               </a:ext>
             </a:extLst>
           </p:cNvPr>
@@ -2797,7 +2802,7 @@
           <p:cNvPr id="2" name="Title Placeholder 1">
             <a:extLst>
               <a:ext uri="{FF2B5EF4-FFF2-40B4-BE49-F238E27FC236}">
-                <a16:creationId xmlns:a16="http://schemas.microsoft.com/office/drawing/2014/main" id="{73A8273C-A1B1-47B3-94CE-90DCB8FE7E36}"/>
+                <a16:creationId xmlns:a16="http://schemas.microsoft.com/office/drawing/2014/main" xmlns="" id="{73A8273C-A1B1-47B3-94CE-90DCB8FE7E36}"/>
               </a:ext>
             </a:extLst>
           </p:cNvPr>
@@ -2835,7 +2840,7 @@
           <p:cNvPr id="3" name="Text Placeholder 2">
             <a:extLst>
               <a:ext uri="{FF2B5EF4-FFF2-40B4-BE49-F238E27FC236}">
-                <a16:creationId xmlns:a16="http://schemas.microsoft.com/office/drawing/2014/main" id="{D26DD665-0D0C-44D4-9C1C-94F13740D1C3}"/>
+                <a16:creationId xmlns:a16="http://schemas.microsoft.com/office/drawing/2014/main" xmlns="" id="{D26DD665-0D0C-44D4-9C1C-94F13740D1C3}"/>
               </a:ext>
             </a:extLst>
           </p:cNvPr>
@@ -2902,7 +2907,7 @@
           <p:cNvPr id="4" name="Date Placeholder 3">
             <a:extLst>
               <a:ext uri="{FF2B5EF4-FFF2-40B4-BE49-F238E27FC236}">
-                <a16:creationId xmlns:a16="http://schemas.microsoft.com/office/drawing/2014/main" id="{5B666D2F-10CC-4E73-88E5-04E8FAA6D065}"/>
+                <a16:creationId xmlns:a16="http://schemas.microsoft.com/office/drawing/2014/main" xmlns="" id="{5B666D2F-10CC-4E73-88E5-04E8FAA6D065}"/>
               </a:ext>
             </a:extLst>
           </p:cNvPr>
@@ -2938,7 +2943,7 @@
           <a:p>
             <a:fld id="{A51D3C03-39B8-4933-B818-F90CC415D817}" type="datetimeFigureOut">
               <a:rPr lang="en-US" smtClean="0"/>
-              <a:t>2/1/2021</a:t>
+              <a:t>2/3/2021</a:t>
             </a:fld>
             <a:endParaRPr lang="en-US"/>
           </a:p>
@@ -2949,7 +2954,7 @@
           <p:cNvPr id="5" name="Footer Placeholder 4">
             <a:extLst>
               <a:ext uri="{FF2B5EF4-FFF2-40B4-BE49-F238E27FC236}">
-                <a16:creationId xmlns:a16="http://schemas.microsoft.com/office/drawing/2014/main" id="{C7610F7E-7A46-4B29-9D00-3AE5A70B82B2}"/>
+                <a16:creationId xmlns:a16="http://schemas.microsoft.com/office/drawing/2014/main" xmlns="" id="{C7610F7E-7A46-4B29-9D00-3AE5A70B82B2}"/>
               </a:ext>
             </a:extLst>
           </p:cNvPr>
@@ -2992,7 +2997,7 @@
           <p:cNvPr id="6" name="Slide Number Placeholder 5">
             <a:extLst>
               <a:ext uri="{FF2B5EF4-FFF2-40B4-BE49-F238E27FC236}">
-                <a16:creationId xmlns:a16="http://schemas.microsoft.com/office/drawing/2014/main" id="{5554AC2F-491F-446B-A2B3-A9070001AA8E}"/>
+                <a16:creationId xmlns:a16="http://schemas.microsoft.com/office/drawing/2014/main" xmlns="" id="{5554AC2F-491F-446B-A2B3-A9070001AA8E}"/>
               </a:ext>
             </a:extLst>
           </p:cNvPr>
@@ -3360,7 +3365,7 @@
           <p:cNvPr id="2" name="Title 1">
             <a:extLst>
               <a:ext uri="{FF2B5EF4-FFF2-40B4-BE49-F238E27FC236}">
-                <a16:creationId xmlns:a16="http://schemas.microsoft.com/office/drawing/2014/main" id="{AC125B72-5311-4114-A1EE-004705A655CB}"/>
+                <a16:creationId xmlns:a16="http://schemas.microsoft.com/office/drawing/2014/main" xmlns="" id="{AC125B72-5311-4114-A1EE-004705A655CB}"/>
               </a:ext>
             </a:extLst>
           </p:cNvPr>
@@ -3388,7 +3393,7 @@
           <p:cNvPr id="3" name="Subtitle 2">
             <a:extLst>
               <a:ext uri="{FF2B5EF4-FFF2-40B4-BE49-F238E27FC236}">
-                <a16:creationId xmlns:a16="http://schemas.microsoft.com/office/drawing/2014/main" id="{93102D37-C358-4D9E-8BEC-27400FCF2CE6}"/>
+                <a16:creationId xmlns:a16="http://schemas.microsoft.com/office/drawing/2014/main" xmlns="" id="{93102D37-C358-4D9E-8BEC-27400FCF2CE6}"/>
               </a:ext>
             </a:extLst>
           </p:cNvPr>
@@ -3418,6 +3423,13 @@
   <p:clrMapOvr>
     <a:masterClrMapping/>
   </p:clrMapOvr>
+  <p:timing>
+    <p:tnLst>
+      <p:par>
+        <p:cTn id="1" dur="indefinite" restart="never" nodeType="tmRoot"/>
+      </p:par>
+    </p:tnLst>
+  </p:timing>
 </p:sld>
 </file>
 
@@ -3443,7 +3455,7 @@
           <p:cNvPr id="2" name="Title 1">
             <a:extLst>
               <a:ext uri="{FF2B5EF4-FFF2-40B4-BE49-F238E27FC236}">
-                <a16:creationId xmlns:a16="http://schemas.microsoft.com/office/drawing/2014/main" id="{D66366E2-F972-42FE-B3A1-1ABEEA0CCEA2}"/>
+                <a16:creationId xmlns:a16="http://schemas.microsoft.com/office/drawing/2014/main" xmlns="" id="{D66366E2-F972-42FE-B3A1-1ABEEA0CCEA2}"/>
               </a:ext>
             </a:extLst>
           </p:cNvPr>
@@ -3479,7 +3491,7 @@
           <p:cNvPr id="3" name="Content Placeholder 2">
             <a:extLst>
               <a:ext uri="{FF2B5EF4-FFF2-40B4-BE49-F238E27FC236}">
-                <a16:creationId xmlns:a16="http://schemas.microsoft.com/office/drawing/2014/main" id="{72A594DD-16C5-47CF-8677-0B9119BE3E02}"/>
+                <a16:creationId xmlns:a16="http://schemas.microsoft.com/office/drawing/2014/main" xmlns="" id="{72A594DD-16C5-47CF-8677-0B9119BE3E02}"/>
               </a:ext>
             </a:extLst>
           </p:cNvPr>
@@ -3676,6 +3688,13 @@
   <p:clrMapOvr>
     <a:masterClrMapping/>
   </p:clrMapOvr>
+  <p:timing>
+    <p:tnLst>
+      <p:par>
+        <p:cTn id="1" dur="indefinite" restart="never" nodeType="tmRoot"/>
+      </p:par>
+    </p:tnLst>
+  </p:timing>
 </p:sld>
 </file>
 
@@ -3701,7 +3720,7 @@
           <p:cNvPr id="2" name="Title 1">
             <a:extLst>
               <a:ext uri="{FF2B5EF4-FFF2-40B4-BE49-F238E27FC236}">
-                <a16:creationId xmlns:a16="http://schemas.microsoft.com/office/drawing/2014/main" id="{DA7DE27B-2194-497D-B956-2168C6D8FEB7}"/>
+                <a16:creationId xmlns:a16="http://schemas.microsoft.com/office/drawing/2014/main" xmlns="" id="{DA7DE27B-2194-497D-B956-2168C6D8FEB7}"/>
               </a:ext>
             </a:extLst>
           </p:cNvPr>
@@ -3733,7 +3752,7 @@
           <p:cNvPr id="7" name="Content Placeholder 6">
             <a:extLst>
               <a:ext uri="{FF2B5EF4-FFF2-40B4-BE49-F238E27FC236}">
-                <a16:creationId xmlns:a16="http://schemas.microsoft.com/office/drawing/2014/main" id="{A9973C7A-7685-4B16-B6F8-E6135E0F5C09}"/>
+                <a16:creationId xmlns:a16="http://schemas.microsoft.com/office/drawing/2014/main" xmlns="" id="{A9973C7A-7685-4B16-B6F8-E6135E0F5C09}"/>
               </a:ext>
             </a:extLst>
           </p:cNvPr>
@@ -3770,6 +3789,13 @@
   <p:clrMapOvr>
     <a:masterClrMapping/>
   </p:clrMapOvr>
+  <p:timing>
+    <p:tnLst>
+      <p:par>
+        <p:cTn id="1" dur="indefinite" restart="never" nodeType="tmRoot"/>
+      </p:par>
+    </p:tnLst>
+  </p:timing>
 </p:sld>
 </file>
 
@@ -3795,7 +3821,7 @@
           <p:cNvPr id="2" name="Title 1">
             <a:extLst>
               <a:ext uri="{FF2B5EF4-FFF2-40B4-BE49-F238E27FC236}">
-                <a16:creationId xmlns:a16="http://schemas.microsoft.com/office/drawing/2014/main" id="{BC2F6A22-3716-4D8D-9B3F-8AC4D9A5AF35}"/>
+                <a16:creationId xmlns:a16="http://schemas.microsoft.com/office/drawing/2014/main" xmlns="" id="{BC2F6A22-3716-4D8D-9B3F-8AC4D9A5AF35}"/>
               </a:ext>
             </a:extLst>
           </p:cNvPr>
@@ -3823,7 +3849,7 @@
           <p:cNvPr id="4" name="Content Placeholder 3">
             <a:extLst>
               <a:ext uri="{FF2B5EF4-FFF2-40B4-BE49-F238E27FC236}">
-                <a16:creationId xmlns:a16="http://schemas.microsoft.com/office/drawing/2014/main" id="{6E0D766D-DEA2-4269-83AA-D37A38A97B94}"/>
+                <a16:creationId xmlns:a16="http://schemas.microsoft.com/office/drawing/2014/main" xmlns="" id="{6E0D766D-DEA2-4269-83AA-D37A38A97B94}"/>
               </a:ext>
             </a:extLst>
           </p:cNvPr>
@@ -3860,6 +3886,13 @@
   <p:clrMapOvr>
     <a:masterClrMapping/>
   </p:clrMapOvr>
+  <p:timing>
+    <p:tnLst>
+      <p:par>
+        <p:cTn id="1" dur="indefinite" restart="never" nodeType="tmRoot"/>
+      </p:par>
+    </p:tnLst>
+  </p:timing>
 </p:sld>
 </file>
 
@@ -3885,7 +3918,7 @@
           <p:cNvPr id="2" name="Title 1">
             <a:extLst>
               <a:ext uri="{FF2B5EF4-FFF2-40B4-BE49-F238E27FC236}">
-                <a16:creationId xmlns:a16="http://schemas.microsoft.com/office/drawing/2014/main" id="{5CBEF7C2-2CFF-4FCE-982B-0815D478E16D}"/>
+                <a16:creationId xmlns:a16="http://schemas.microsoft.com/office/drawing/2014/main" xmlns="" id="{5CBEF7C2-2CFF-4FCE-982B-0815D478E16D}"/>
               </a:ext>
             </a:extLst>
           </p:cNvPr>
@@ -3913,7 +3946,7 @@
           <p:cNvPr id="4" name="Content Placeholder 3">
             <a:extLst>
               <a:ext uri="{FF2B5EF4-FFF2-40B4-BE49-F238E27FC236}">
-                <a16:creationId xmlns:a16="http://schemas.microsoft.com/office/drawing/2014/main" id="{7A327141-797B-4540-A961-C62F0756C799}"/>
+                <a16:creationId xmlns:a16="http://schemas.microsoft.com/office/drawing/2014/main" xmlns="" id="{7A327141-797B-4540-A961-C62F0756C799}"/>
               </a:ext>
             </a:extLst>
           </p:cNvPr>
@@ -3975,7 +4008,7 @@
           <p:cNvPr id="2" name="Title 1">
             <a:extLst>
               <a:ext uri="{FF2B5EF4-FFF2-40B4-BE49-F238E27FC236}">
-                <a16:creationId xmlns:a16="http://schemas.microsoft.com/office/drawing/2014/main" id="{9621458D-96BC-420B-AC23-E4F891BFEC23}"/>
+                <a16:creationId xmlns:a16="http://schemas.microsoft.com/office/drawing/2014/main" xmlns="" id="{9621458D-96BC-420B-AC23-E4F891BFEC23}"/>
               </a:ext>
             </a:extLst>
           </p:cNvPr>
@@ -4003,7 +4036,7 @@
           <p:cNvPr id="4" name="Content Placeholder 3">
             <a:extLst>
               <a:ext uri="{FF2B5EF4-FFF2-40B4-BE49-F238E27FC236}">
-                <a16:creationId xmlns:a16="http://schemas.microsoft.com/office/drawing/2014/main" id="{82728162-0CEE-4E58-AE7E-B5AB78E873A7}"/>
+                <a16:creationId xmlns:a16="http://schemas.microsoft.com/office/drawing/2014/main" xmlns="" id="{82728162-0CEE-4E58-AE7E-B5AB78E873A7}"/>
               </a:ext>
             </a:extLst>
           </p:cNvPr>
@@ -4065,7 +4098,7 @@
           <p:cNvPr id="2" name="Title 1">
             <a:extLst>
               <a:ext uri="{FF2B5EF4-FFF2-40B4-BE49-F238E27FC236}">
-                <a16:creationId xmlns:a16="http://schemas.microsoft.com/office/drawing/2014/main" id="{F32DFC3A-6299-46EB-9E84-AB1091726F22}"/>
+                <a16:creationId xmlns:a16="http://schemas.microsoft.com/office/drawing/2014/main" xmlns="" id="{F32DFC3A-6299-46EB-9E84-AB1091726F22}"/>
               </a:ext>
             </a:extLst>
           </p:cNvPr>
@@ -4093,7 +4126,7 @@
           <p:cNvPr id="3" name="Content Placeholder 2">
             <a:extLst>
               <a:ext uri="{FF2B5EF4-FFF2-40B4-BE49-F238E27FC236}">
-                <a16:creationId xmlns:a16="http://schemas.microsoft.com/office/drawing/2014/main" id="{29F5852A-BCA2-493B-81B4-2D466CD73D2C}"/>
+                <a16:creationId xmlns:a16="http://schemas.microsoft.com/office/drawing/2014/main" xmlns="" id="{29F5852A-BCA2-493B-81B4-2D466CD73D2C}"/>
               </a:ext>
             </a:extLst>
           </p:cNvPr>
@@ -4252,7 +4285,7 @@
           <p:cNvPr id="2" name="Title 1">
             <a:extLst>
               <a:ext uri="{FF2B5EF4-FFF2-40B4-BE49-F238E27FC236}">
-                <a16:creationId xmlns:a16="http://schemas.microsoft.com/office/drawing/2014/main" id="{0EE56578-79BF-42BC-9408-AC3352DFA310}"/>
+                <a16:creationId xmlns:a16="http://schemas.microsoft.com/office/drawing/2014/main" xmlns="" id="{0EE56578-79BF-42BC-9408-AC3352DFA310}"/>
               </a:ext>
             </a:extLst>
           </p:cNvPr>
@@ -4300,7 +4333,7 @@
           <p:cNvPr id="3" name="Content Placeholder 2">
             <a:extLst>
               <a:ext uri="{FF2B5EF4-FFF2-40B4-BE49-F238E27FC236}">
-                <a16:creationId xmlns:a16="http://schemas.microsoft.com/office/drawing/2014/main" id="{F2A88907-65D9-4156-882D-4D47E886A19D}"/>
+                <a16:creationId xmlns:a16="http://schemas.microsoft.com/office/drawing/2014/main" xmlns="" id="{F2A88907-65D9-4156-882D-4D47E886A19D}"/>
               </a:ext>
             </a:extLst>
           </p:cNvPr>
@@ -4445,7 +4478,7 @@
           <p:cNvPr id="2" name="Title 1">
             <a:extLst>
               <a:ext uri="{FF2B5EF4-FFF2-40B4-BE49-F238E27FC236}">
-                <a16:creationId xmlns:a16="http://schemas.microsoft.com/office/drawing/2014/main" id="{E32F073A-2CD6-404B-92CF-40A767B4B233}"/>
+                <a16:creationId xmlns:a16="http://schemas.microsoft.com/office/drawing/2014/main" xmlns="" id="{E32F073A-2CD6-404B-92CF-40A767B4B233}"/>
               </a:ext>
             </a:extLst>
           </p:cNvPr>
@@ -4493,7 +4526,7 @@
           <p:cNvPr id="3" name="Content Placeholder 2">
             <a:extLst>
               <a:ext uri="{FF2B5EF4-FFF2-40B4-BE49-F238E27FC236}">
-                <a16:creationId xmlns:a16="http://schemas.microsoft.com/office/drawing/2014/main" id="{A9087806-B860-40B4-ADBC-B6D2772C9F41}"/>
+                <a16:creationId xmlns:a16="http://schemas.microsoft.com/office/drawing/2014/main" xmlns="" id="{A9087806-B860-40B4-ADBC-B6D2772C9F41}"/>
               </a:ext>
             </a:extLst>
           </p:cNvPr>
@@ -4651,7 +4684,7 @@
           <p:cNvPr id="2" name="Title 1">
             <a:extLst>
               <a:ext uri="{FF2B5EF4-FFF2-40B4-BE49-F238E27FC236}">
-                <a16:creationId xmlns:a16="http://schemas.microsoft.com/office/drawing/2014/main" id="{1A7A417B-74AF-44E1-9622-7F76CE2E9769}"/>
+                <a16:creationId xmlns:a16="http://schemas.microsoft.com/office/drawing/2014/main" xmlns="" id="{1A7A417B-74AF-44E1-9622-7F76CE2E9769}"/>
               </a:ext>
             </a:extLst>
           </p:cNvPr>
@@ -4679,7 +4712,7 @@
           <p:cNvPr id="3" name="Content Placeholder 2">
             <a:extLst>
               <a:ext uri="{FF2B5EF4-FFF2-40B4-BE49-F238E27FC236}">
-                <a16:creationId xmlns:a16="http://schemas.microsoft.com/office/drawing/2014/main" id="{2F7027B4-2D70-4FEB-9CB8-65EF84AC9FB2}"/>
+                <a16:creationId xmlns:a16="http://schemas.microsoft.com/office/drawing/2014/main" xmlns="" id="{2F7027B4-2D70-4FEB-9CB8-65EF84AC9FB2}"/>
               </a:ext>
             </a:extLst>
           </p:cNvPr>
@@ -4749,7 +4782,7 @@
           <p:cNvPr id="2" name="Title 1">
             <a:extLst>
               <a:ext uri="{FF2B5EF4-FFF2-40B4-BE49-F238E27FC236}">
-                <a16:creationId xmlns:a16="http://schemas.microsoft.com/office/drawing/2014/main" id="{73B1B58A-94F5-46B9-963C-33784088B8FE}"/>
+                <a16:creationId xmlns:a16="http://schemas.microsoft.com/office/drawing/2014/main" xmlns="" id="{73B1B58A-94F5-46B9-963C-33784088B8FE}"/>
               </a:ext>
             </a:extLst>
           </p:cNvPr>
@@ -4797,7 +4830,7 @@
           <p:cNvPr id="3" name="Content Placeholder 2">
             <a:extLst>
               <a:ext uri="{FF2B5EF4-FFF2-40B4-BE49-F238E27FC236}">
-                <a16:creationId xmlns:a16="http://schemas.microsoft.com/office/drawing/2014/main" id="{B6DDA67A-E58A-48DD-BFE0-5362CE9641FB}"/>
+                <a16:creationId xmlns:a16="http://schemas.microsoft.com/office/drawing/2014/main" xmlns="" id="{B6DDA67A-E58A-48DD-BFE0-5362CE9641FB}"/>
               </a:ext>
             </a:extLst>
           </p:cNvPr>
@@ -4934,7 +4967,7 @@
           <p:cNvPr id="2" name="Title 1">
             <a:extLst>
               <a:ext uri="{FF2B5EF4-FFF2-40B4-BE49-F238E27FC236}">
-                <a16:creationId xmlns:a16="http://schemas.microsoft.com/office/drawing/2014/main" id="{1FFD25DD-379F-406C-BF87-18FE25BD0063}"/>
+                <a16:creationId xmlns:a16="http://schemas.microsoft.com/office/drawing/2014/main" xmlns="" id="{1FFD25DD-379F-406C-BF87-18FE25BD0063}"/>
               </a:ext>
             </a:extLst>
           </p:cNvPr>
@@ -4962,7 +4995,7 @@
           <p:cNvPr id="3" name="Content Placeholder 2">
             <a:extLst>
               <a:ext uri="{FF2B5EF4-FFF2-40B4-BE49-F238E27FC236}">
-                <a16:creationId xmlns:a16="http://schemas.microsoft.com/office/drawing/2014/main" id="{A1110104-2BEC-4A10-9F78-343776120355}"/>
+                <a16:creationId xmlns:a16="http://schemas.microsoft.com/office/drawing/2014/main" xmlns="" id="{A1110104-2BEC-4A10-9F78-343776120355}"/>
               </a:ext>
             </a:extLst>
           </p:cNvPr>
@@ -5052,7 +5085,7 @@
           <p:cNvPr id="4" name="Picture 3">
             <a:extLst>
               <a:ext uri="{FF2B5EF4-FFF2-40B4-BE49-F238E27FC236}">
-                <a16:creationId xmlns:a16="http://schemas.microsoft.com/office/drawing/2014/main" id="{5B500D2D-A563-48AD-B12D-0A19AA0B95DC}"/>
+                <a16:creationId xmlns:a16="http://schemas.microsoft.com/office/drawing/2014/main" xmlns="" id="{5B500D2D-A563-48AD-B12D-0A19AA0B95DC}"/>
               </a:ext>
             </a:extLst>
           </p:cNvPr>
@@ -5087,6 +5120,13 @@
   <p:clrMapOvr>
     <a:masterClrMapping/>
   </p:clrMapOvr>
+  <p:timing>
+    <p:tnLst>
+      <p:par>
+        <p:cTn id="1" dur="indefinite" restart="never" nodeType="tmRoot"/>
+      </p:par>
+    </p:tnLst>
+  </p:timing>
 </p:sld>
 </file>
 
@@ -5112,7 +5152,7 @@
           <p:cNvPr id="2" name="Title 1">
             <a:extLst>
               <a:ext uri="{FF2B5EF4-FFF2-40B4-BE49-F238E27FC236}">
-                <a16:creationId xmlns:a16="http://schemas.microsoft.com/office/drawing/2014/main" id="{57920C0D-063A-4488-92DC-B5189B7E0332}"/>
+                <a16:creationId xmlns:a16="http://schemas.microsoft.com/office/drawing/2014/main" xmlns="" id="{57920C0D-063A-4488-92DC-B5189B7E0332}"/>
               </a:ext>
             </a:extLst>
           </p:cNvPr>
@@ -5160,7 +5200,7 @@
           <p:cNvPr id="3" name="Content Placeholder 2">
             <a:extLst>
               <a:ext uri="{FF2B5EF4-FFF2-40B4-BE49-F238E27FC236}">
-                <a16:creationId xmlns:a16="http://schemas.microsoft.com/office/drawing/2014/main" id="{80F37992-217C-41D0-A333-17B0FCC82EB9}"/>
+                <a16:creationId xmlns:a16="http://schemas.microsoft.com/office/drawing/2014/main" xmlns="" id="{80F37992-217C-41D0-A333-17B0FCC82EB9}"/>
               </a:ext>
             </a:extLst>
           </p:cNvPr>
@@ -5292,7 +5332,7 @@
           <p:cNvPr id="2" name="Title 1">
             <a:extLst>
               <a:ext uri="{FF2B5EF4-FFF2-40B4-BE49-F238E27FC236}">
-                <a16:creationId xmlns:a16="http://schemas.microsoft.com/office/drawing/2014/main" id="{4A55F1F5-E369-4362-8F35-4CAEF2816838}"/>
+                <a16:creationId xmlns:a16="http://schemas.microsoft.com/office/drawing/2014/main" xmlns="" id="{4A55F1F5-E369-4362-8F35-4CAEF2816838}"/>
               </a:ext>
             </a:extLst>
           </p:cNvPr>
@@ -5320,7 +5360,7 @@
           <p:cNvPr id="3" name="Content Placeholder 2">
             <a:extLst>
               <a:ext uri="{FF2B5EF4-FFF2-40B4-BE49-F238E27FC236}">
-                <a16:creationId xmlns:a16="http://schemas.microsoft.com/office/drawing/2014/main" id="{87F1638C-B9F1-4099-BDA4-959F0D2823A9}"/>
+                <a16:creationId xmlns:a16="http://schemas.microsoft.com/office/drawing/2014/main" xmlns="" id="{87F1638C-B9F1-4099-BDA4-959F0D2823A9}"/>
               </a:ext>
             </a:extLst>
           </p:cNvPr>
@@ -5409,7 +5449,7 @@
           <p:cNvPr id="2" name="Title 1">
             <a:extLst>
               <a:ext uri="{FF2B5EF4-FFF2-40B4-BE49-F238E27FC236}">
-                <a16:creationId xmlns:a16="http://schemas.microsoft.com/office/drawing/2014/main" id="{00A29309-BB82-4A45-96D5-7BE04C6EC583}"/>
+                <a16:creationId xmlns:a16="http://schemas.microsoft.com/office/drawing/2014/main" xmlns="" id="{00A29309-BB82-4A45-96D5-7BE04C6EC583}"/>
               </a:ext>
             </a:extLst>
           </p:cNvPr>
@@ -5437,7 +5477,7 @@
           <p:cNvPr id="3" name="Content Placeholder 2">
             <a:extLst>
               <a:ext uri="{FF2B5EF4-FFF2-40B4-BE49-F238E27FC236}">
-                <a16:creationId xmlns:a16="http://schemas.microsoft.com/office/drawing/2014/main" id="{6C830286-1C36-4466-AD30-7B77082E7F40}"/>
+                <a16:creationId xmlns:a16="http://schemas.microsoft.com/office/drawing/2014/main" xmlns="" id="{6C830286-1C36-4466-AD30-7B77082E7F40}"/>
               </a:ext>
             </a:extLst>
           </p:cNvPr>
@@ -5502,7 +5542,7 @@
           <p:cNvPr id="4" name="Picture 3">
             <a:extLst>
               <a:ext uri="{FF2B5EF4-FFF2-40B4-BE49-F238E27FC236}">
-                <a16:creationId xmlns:a16="http://schemas.microsoft.com/office/drawing/2014/main" id="{C7E95F7F-F475-4764-91E7-90E1A3785230}"/>
+                <a16:creationId xmlns:a16="http://schemas.microsoft.com/office/drawing/2014/main" xmlns="" id="{C7E95F7F-F475-4764-91E7-90E1A3785230}"/>
               </a:ext>
             </a:extLst>
           </p:cNvPr>
@@ -5562,7 +5602,7 @@
           <p:cNvPr id="2" name="Title 1">
             <a:extLst>
               <a:ext uri="{FF2B5EF4-FFF2-40B4-BE49-F238E27FC236}">
-                <a16:creationId xmlns:a16="http://schemas.microsoft.com/office/drawing/2014/main" id="{BD22A24E-8BF0-4D44-B09B-E2174695DFFC}"/>
+                <a16:creationId xmlns:a16="http://schemas.microsoft.com/office/drawing/2014/main" xmlns="" id="{BD22A24E-8BF0-4D44-B09B-E2174695DFFC}"/>
               </a:ext>
             </a:extLst>
           </p:cNvPr>
@@ -5590,7 +5630,7 @@
           <p:cNvPr id="3" name="Content Placeholder 2">
             <a:extLst>
               <a:ext uri="{FF2B5EF4-FFF2-40B4-BE49-F238E27FC236}">
-                <a16:creationId xmlns:a16="http://schemas.microsoft.com/office/drawing/2014/main" id="{606AE81C-C08E-4F4A-9362-0041DA1C54FB}"/>
+                <a16:creationId xmlns:a16="http://schemas.microsoft.com/office/drawing/2014/main" xmlns="" id="{606AE81C-C08E-4F4A-9362-0041DA1C54FB}"/>
               </a:ext>
             </a:extLst>
           </p:cNvPr>
@@ -5750,7 +5790,7 @@
           <p:cNvPr id="2" name="Title 1">
             <a:extLst>
               <a:ext uri="{FF2B5EF4-FFF2-40B4-BE49-F238E27FC236}">
-                <a16:creationId xmlns:a16="http://schemas.microsoft.com/office/drawing/2014/main" id="{CDF22EAE-24A3-48C6-8885-7F4AB9F95602}"/>
+                <a16:creationId xmlns:a16="http://schemas.microsoft.com/office/drawing/2014/main" xmlns="" id="{CDF22EAE-24A3-48C6-8885-7F4AB9F95602}"/>
               </a:ext>
             </a:extLst>
           </p:cNvPr>
@@ -5778,7 +5818,7 @@
           <p:cNvPr id="3" name="Content Placeholder 2">
             <a:extLst>
               <a:ext uri="{FF2B5EF4-FFF2-40B4-BE49-F238E27FC236}">
-                <a16:creationId xmlns:a16="http://schemas.microsoft.com/office/drawing/2014/main" id="{2A241BB6-D66C-4EE2-8411-B0790E4ED256}"/>
+                <a16:creationId xmlns:a16="http://schemas.microsoft.com/office/drawing/2014/main" xmlns="" id="{2A241BB6-D66C-4EE2-8411-B0790E4ED256}"/>
               </a:ext>
             </a:extLst>
           </p:cNvPr>
@@ -5935,7 +5975,7 @@
           <p:cNvPr id="2" name="Title 1">
             <a:extLst>
               <a:ext uri="{FF2B5EF4-FFF2-40B4-BE49-F238E27FC236}">
-                <a16:creationId xmlns:a16="http://schemas.microsoft.com/office/drawing/2014/main" id="{8AD2DC0B-37DC-4B4A-B394-C8FA60D7094F}"/>
+                <a16:creationId xmlns:a16="http://schemas.microsoft.com/office/drawing/2014/main" xmlns="" id="{8AD2DC0B-37DC-4B4A-B394-C8FA60D7094F}"/>
               </a:ext>
             </a:extLst>
           </p:cNvPr>
@@ -5963,7 +6003,7 @@
           <p:cNvPr id="3" name="Content Placeholder 2">
             <a:extLst>
               <a:ext uri="{FF2B5EF4-FFF2-40B4-BE49-F238E27FC236}">
-                <a16:creationId xmlns:a16="http://schemas.microsoft.com/office/drawing/2014/main" id="{A8E5DC44-3E92-47D6-9CED-584F86A972AF}"/>
+                <a16:creationId xmlns:a16="http://schemas.microsoft.com/office/drawing/2014/main" xmlns="" id="{A8E5DC44-3E92-47D6-9CED-584F86A972AF}"/>
               </a:ext>
             </a:extLst>
           </p:cNvPr>
@@ -6140,7 +6180,7 @@
           <p:cNvPr id="2" name="Title 1">
             <a:extLst>
               <a:ext uri="{FF2B5EF4-FFF2-40B4-BE49-F238E27FC236}">
-                <a16:creationId xmlns:a16="http://schemas.microsoft.com/office/drawing/2014/main" id="{653F9B97-3E46-44F8-A53B-084B0C6FE3D6}"/>
+                <a16:creationId xmlns:a16="http://schemas.microsoft.com/office/drawing/2014/main" xmlns="" id="{653F9B97-3E46-44F8-A53B-084B0C6FE3D6}"/>
               </a:ext>
             </a:extLst>
           </p:cNvPr>
@@ -6168,7 +6208,7 @@
           <p:cNvPr id="3" name="Content Placeholder 2">
             <a:extLst>
               <a:ext uri="{FF2B5EF4-FFF2-40B4-BE49-F238E27FC236}">
-                <a16:creationId xmlns:a16="http://schemas.microsoft.com/office/drawing/2014/main" id="{CA8B9778-5B47-453F-AAAE-35CBFE050EEC}"/>
+                <a16:creationId xmlns:a16="http://schemas.microsoft.com/office/drawing/2014/main" xmlns="" id="{CA8B9778-5B47-453F-AAAE-35CBFE050EEC}"/>
               </a:ext>
             </a:extLst>
           </p:cNvPr>
@@ -6489,7 +6529,7 @@
           <p:cNvPr id="5" name="Straight Arrow Connector 4">
             <a:extLst>
               <a:ext uri="{FF2B5EF4-FFF2-40B4-BE49-F238E27FC236}">
-                <a16:creationId xmlns:a16="http://schemas.microsoft.com/office/drawing/2014/main" id="{C8BFEDAD-6A33-426B-99F1-7D5D4A5CE4BC}"/>
+                <a16:creationId xmlns:a16="http://schemas.microsoft.com/office/drawing/2014/main" xmlns="" id="{C8BFEDAD-6A33-426B-99F1-7D5D4A5CE4BC}"/>
               </a:ext>
             </a:extLst>
           </p:cNvPr>
@@ -6530,7 +6570,7 @@
           <p:cNvPr id="7" name="Straight Arrow Connector 6">
             <a:extLst>
               <a:ext uri="{FF2B5EF4-FFF2-40B4-BE49-F238E27FC236}">
-                <a16:creationId xmlns:a16="http://schemas.microsoft.com/office/drawing/2014/main" id="{F5A76B8B-3602-435E-AF63-FD212419F81D}"/>
+                <a16:creationId xmlns:a16="http://schemas.microsoft.com/office/drawing/2014/main" xmlns="" id="{F5A76B8B-3602-435E-AF63-FD212419F81D}"/>
               </a:ext>
             </a:extLst>
           </p:cNvPr>
@@ -6571,7 +6611,7 @@
           <p:cNvPr id="9" name="Straight Arrow Connector 8">
             <a:extLst>
               <a:ext uri="{FF2B5EF4-FFF2-40B4-BE49-F238E27FC236}">
-                <a16:creationId xmlns:a16="http://schemas.microsoft.com/office/drawing/2014/main" id="{327964AC-6BEE-4E7A-A3C7-20278FC4082C}"/>
+                <a16:creationId xmlns:a16="http://schemas.microsoft.com/office/drawing/2014/main" xmlns="" id="{327964AC-6BEE-4E7A-A3C7-20278FC4082C}"/>
               </a:ext>
             </a:extLst>
           </p:cNvPr>
@@ -6642,7 +6682,7 @@
           <p:cNvPr id="2" name="Title 1">
             <a:extLst>
               <a:ext uri="{FF2B5EF4-FFF2-40B4-BE49-F238E27FC236}">
-                <a16:creationId xmlns:a16="http://schemas.microsoft.com/office/drawing/2014/main" id="{37B5490A-8414-4FF1-94E5-D83DC61F70AE}"/>
+                <a16:creationId xmlns:a16="http://schemas.microsoft.com/office/drawing/2014/main" xmlns="" id="{37B5490A-8414-4FF1-94E5-D83DC61F70AE}"/>
               </a:ext>
             </a:extLst>
           </p:cNvPr>
@@ -6670,7 +6710,7 @@
           <p:cNvPr id="3" name="Content Placeholder 2">
             <a:extLst>
               <a:ext uri="{FF2B5EF4-FFF2-40B4-BE49-F238E27FC236}">
-                <a16:creationId xmlns:a16="http://schemas.microsoft.com/office/drawing/2014/main" id="{A7299CAF-F6CC-4A06-AEF9-202CA94BEC6A}"/>
+                <a16:creationId xmlns:a16="http://schemas.microsoft.com/office/drawing/2014/main" xmlns="" id="{A7299CAF-F6CC-4A06-AEF9-202CA94BEC6A}"/>
               </a:ext>
             </a:extLst>
           </p:cNvPr>
@@ -6838,7 +6878,7 @@
           <p:cNvPr id="4" name="Picture 3">
             <a:extLst>
               <a:ext uri="{FF2B5EF4-FFF2-40B4-BE49-F238E27FC236}">
-                <a16:creationId xmlns:a16="http://schemas.microsoft.com/office/drawing/2014/main" id="{5989965A-E83C-407E-B737-529C40252DE0}"/>
+                <a16:creationId xmlns:a16="http://schemas.microsoft.com/office/drawing/2014/main" xmlns="" id="{5989965A-E83C-407E-B737-529C40252DE0}"/>
               </a:ext>
             </a:extLst>
           </p:cNvPr>
@@ -6868,7 +6908,7 @@
           <p:cNvPr id="5" name="Rectangle 4">
             <a:extLst>
               <a:ext uri="{FF2B5EF4-FFF2-40B4-BE49-F238E27FC236}">
-                <a16:creationId xmlns:a16="http://schemas.microsoft.com/office/drawing/2014/main" id="{54A3037D-02CB-4320-B2DF-981880B9504C}"/>
+                <a16:creationId xmlns:a16="http://schemas.microsoft.com/office/drawing/2014/main" xmlns="" id="{54A3037D-02CB-4320-B2DF-981880B9504C}"/>
               </a:ext>
             </a:extLst>
           </p:cNvPr>
@@ -6916,7 +6956,7 @@
           <p:cNvPr id="7" name="Straight Arrow Connector 6">
             <a:extLst>
               <a:ext uri="{FF2B5EF4-FFF2-40B4-BE49-F238E27FC236}">
-                <a16:creationId xmlns:a16="http://schemas.microsoft.com/office/drawing/2014/main" id="{24B8B9D1-1C4E-4605-8E7D-4BD2598111C3}"/>
+                <a16:creationId xmlns:a16="http://schemas.microsoft.com/office/drawing/2014/main" xmlns="" id="{24B8B9D1-1C4E-4605-8E7D-4BD2598111C3}"/>
               </a:ext>
             </a:extLst>
           </p:cNvPr>
@@ -6957,7 +6997,7 @@
           <p:cNvPr id="9" name="Rectangle 8">
             <a:extLst>
               <a:ext uri="{FF2B5EF4-FFF2-40B4-BE49-F238E27FC236}">
-                <a16:creationId xmlns:a16="http://schemas.microsoft.com/office/drawing/2014/main" id="{91D6C035-08A7-4C5C-9310-9AF181B16DFF}"/>
+                <a16:creationId xmlns:a16="http://schemas.microsoft.com/office/drawing/2014/main" xmlns="" id="{91D6C035-08A7-4C5C-9310-9AF181B16DFF}"/>
               </a:ext>
             </a:extLst>
           </p:cNvPr>
@@ -7035,7 +7075,7 @@
           <p:cNvPr id="2" name="Title 1">
             <a:extLst>
               <a:ext uri="{FF2B5EF4-FFF2-40B4-BE49-F238E27FC236}">
-                <a16:creationId xmlns:a16="http://schemas.microsoft.com/office/drawing/2014/main" id="{71B9EC8A-4C32-4B3D-BD35-FD7B8911ADBD}"/>
+                <a16:creationId xmlns:a16="http://schemas.microsoft.com/office/drawing/2014/main" xmlns="" id="{71B9EC8A-4C32-4B3D-BD35-FD7B8911ADBD}"/>
               </a:ext>
             </a:extLst>
           </p:cNvPr>
@@ -7063,7 +7103,7 @@
           <p:cNvPr id="3" name="Content Placeholder 2">
             <a:extLst>
               <a:ext uri="{FF2B5EF4-FFF2-40B4-BE49-F238E27FC236}">
-                <a16:creationId xmlns:a16="http://schemas.microsoft.com/office/drawing/2014/main" id="{28FA73E7-E1E3-4E4C-BFA1-BC743C06AB26}"/>
+                <a16:creationId xmlns:a16="http://schemas.microsoft.com/office/drawing/2014/main" xmlns="" id="{28FA73E7-E1E3-4E4C-BFA1-BC743C06AB26}"/>
               </a:ext>
             </a:extLst>
           </p:cNvPr>
@@ -7194,7 +7234,7 @@
           <p:cNvPr id="2" name="Title 1">
             <a:extLst>
               <a:ext uri="{FF2B5EF4-FFF2-40B4-BE49-F238E27FC236}">
-                <a16:creationId xmlns:a16="http://schemas.microsoft.com/office/drawing/2014/main" id="{2662C911-CCB4-4B9B-8000-225CB7C4C925}"/>
+                <a16:creationId xmlns:a16="http://schemas.microsoft.com/office/drawing/2014/main" xmlns="" id="{2662C911-CCB4-4B9B-8000-225CB7C4C925}"/>
               </a:ext>
             </a:extLst>
           </p:cNvPr>
@@ -7222,7 +7262,7 @@
           <p:cNvPr id="3" name="Content Placeholder 2">
             <a:extLst>
               <a:ext uri="{FF2B5EF4-FFF2-40B4-BE49-F238E27FC236}">
-                <a16:creationId xmlns:a16="http://schemas.microsoft.com/office/drawing/2014/main" id="{87DBD240-F71E-4667-BAAB-2F2158FA8EEC}"/>
+                <a16:creationId xmlns:a16="http://schemas.microsoft.com/office/drawing/2014/main" xmlns="" id="{87DBD240-F71E-4667-BAAB-2F2158FA8EEC}"/>
               </a:ext>
             </a:extLst>
           </p:cNvPr>
@@ -7362,7 +7402,7 @@
           <p:cNvPr id="5" name="Straight Arrow Connector 4">
             <a:extLst>
               <a:ext uri="{FF2B5EF4-FFF2-40B4-BE49-F238E27FC236}">
-                <a16:creationId xmlns:a16="http://schemas.microsoft.com/office/drawing/2014/main" id="{18731DDA-761D-4C02-BC9E-86CE941B2132}"/>
+                <a16:creationId xmlns:a16="http://schemas.microsoft.com/office/drawing/2014/main" xmlns="" id="{18731DDA-761D-4C02-BC9E-86CE941B2132}"/>
               </a:ext>
             </a:extLst>
           </p:cNvPr>
@@ -7401,7 +7441,7 @@
           <p:cNvPr id="7" name="Straight Arrow Connector 6">
             <a:extLst>
               <a:ext uri="{FF2B5EF4-FFF2-40B4-BE49-F238E27FC236}">
-                <a16:creationId xmlns:a16="http://schemas.microsoft.com/office/drawing/2014/main" id="{FDBDCFEB-E6DB-464F-AF72-64AAB691D45A}"/>
+                <a16:creationId xmlns:a16="http://schemas.microsoft.com/office/drawing/2014/main" xmlns="" id="{FDBDCFEB-E6DB-464F-AF72-64AAB691D45A}"/>
               </a:ext>
             </a:extLst>
           </p:cNvPr>
@@ -7440,7 +7480,7 @@
           <p:cNvPr id="9" name="Straight Arrow Connector 8">
             <a:extLst>
               <a:ext uri="{FF2B5EF4-FFF2-40B4-BE49-F238E27FC236}">
-                <a16:creationId xmlns:a16="http://schemas.microsoft.com/office/drawing/2014/main" id="{6AA4F103-C236-4551-84B1-EC5FB9213452}"/>
+                <a16:creationId xmlns:a16="http://schemas.microsoft.com/office/drawing/2014/main" xmlns="" id="{6AA4F103-C236-4551-84B1-EC5FB9213452}"/>
               </a:ext>
             </a:extLst>
           </p:cNvPr>
@@ -7509,7 +7549,7 @@
           <p:cNvPr id="2" name="Title 1">
             <a:extLst>
               <a:ext uri="{FF2B5EF4-FFF2-40B4-BE49-F238E27FC236}">
-                <a16:creationId xmlns:a16="http://schemas.microsoft.com/office/drawing/2014/main" id="{CEB99266-182F-4943-98F6-DF90F9E96566}"/>
+                <a16:creationId xmlns:a16="http://schemas.microsoft.com/office/drawing/2014/main" xmlns="" id="{CEB99266-182F-4943-98F6-DF90F9E96566}"/>
               </a:ext>
             </a:extLst>
           </p:cNvPr>
@@ -7557,7 +7597,7 @@
           <p:cNvPr id="3" name="Content Placeholder 2">
             <a:extLst>
               <a:ext uri="{FF2B5EF4-FFF2-40B4-BE49-F238E27FC236}">
-                <a16:creationId xmlns:a16="http://schemas.microsoft.com/office/drawing/2014/main" id="{116ACA6A-EBC3-4C7A-BA3D-21A6421EA589}"/>
+                <a16:creationId xmlns:a16="http://schemas.microsoft.com/office/drawing/2014/main" xmlns="" id="{116ACA6A-EBC3-4C7A-BA3D-21A6421EA589}"/>
               </a:ext>
             </a:extLst>
           </p:cNvPr>
@@ -7652,6 +7692,13 @@
   <p:clrMapOvr>
     <a:masterClrMapping/>
   </p:clrMapOvr>
+  <p:timing>
+    <p:tnLst>
+      <p:par>
+        <p:cTn id="1" dur="indefinite" restart="never" nodeType="tmRoot"/>
+      </p:par>
+    </p:tnLst>
+  </p:timing>
 </p:sld>
 </file>
 
@@ -7677,7 +7724,7 @@
           <p:cNvPr id="2" name="Title 1">
             <a:extLst>
               <a:ext uri="{FF2B5EF4-FFF2-40B4-BE49-F238E27FC236}">
-                <a16:creationId xmlns:a16="http://schemas.microsoft.com/office/drawing/2014/main" id="{46C90E8D-22BE-4570-A75F-0726C9258447}"/>
+                <a16:creationId xmlns:a16="http://schemas.microsoft.com/office/drawing/2014/main" xmlns="" id="{46C90E8D-22BE-4570-A75F-0726C9258447}"/>
               </a:ext>
             </a:extLst>
           </p:cNvPr>
@@ -7705,7 +7752,7 @@
           <p:cNvPr id="3" name="Content Placeholder 2">
             <a:extLst>
               <a:ext uri="{FF2B5EF4-FFF2-40B4-BE49-F238E27FC236}">
-                <a16:creationId xmlns:a16="http://schemas.microsoft.com/office/drawing/2014/main" id="{624B39EB-BAD5-433D-8E62-CFD137FF65B3}"/>
+                <a16:creationId xmlns:a16="http://schemas.microsoft.com/office/drawing/2014/main" xmlns="" id="{624B39EB-BAD5-433D-8E62-CFD137FF65B3}"/>
               </a:ext>
             </a:extLst>
           </p:cNvPr>
@@ -7823,7 +7870,7 @@
           <p:cNvPr id="6" name="Arrow: Right 5">
             <a:extLst>
               <a:ext uri="{FF2B5EF4-FFF2-40B4-BE49-F238E27FC236}">
-                <a16:creationId xmlns:a16="http://schemas.microsoft.com/office/drawing/2014/main" id="{46E779E4-52FB-4CC0-9E94-4F88F8EA6B7E}"/>
+                <a16:creationId xmlns:a16="http://schemas.microsoft.com/office/drawing/2014/main" xmlns="" id="{46E779E4-52FB-4CC0-9E94-4F88F8EA6B7E}"/>
               </a:ext>
             </a:extLst>
           </p:cNvPr>
@@ -7869,7 +7916,7 @@
           <p:cNvPr id="7" name="Arrow: Right 6">
             <a:extLst>
               <a:ext uri="{FF2B5EF4-FFF2-40B4-BE49-F238E27FC236}">
-                <a16:creationId xmlns:a16="http://schemas.microsoft.com/office/drawing/2014/main" id="{F73415B0-EC40-4DFF-86E2-C5159595B072}"/>
+                <a16:creationId xmlns:a16="http://schemas.microsoft.com/office/drawing/2014/main" xmlns="" id="{F73415B0-EC40-4DFF-86E2-C5159595B072}"/>
               </a:ext>
             </a:extLst>
           </p:cNvPr>
@@ -7945,7 +7992,7 @@
           <p:cNvPr id="2" name="Title 1">
             <a:extLst>
               <a:ext uri="{FF2B5EF4-FFF2-40B4-BE49-F238E27FC236}">
-                <a16:creationId xmlns:a16="http://schemas.microsoft.com/office/drawing/2014/main" id="{8F84A389-1FD0-4671-B430-8E7C06D52697}"/>
+                <a16:creationId xmlns:a16="http://schemas.microsoft.com/office/drawing/2014/main" xmlns="" id="{8F84A389-1FD0-4671-B430-8E7C06D52697}"/>
               </a:ext>
             </a:extLst>
           </p:cNvPr>
@@ -7973,7 +8020,7 @@
           <p:cNvPr id="3" name="Content Placeholder 2">
             <a:extLst>
               <a:ext uri="{FF2B5EF4-FFF2-40B4-BE49-F238E27FC236}">
-                <a16:creationId xmlns:a16="http://schemas.microsoft.com/office/drawing/2014/main" id="{1012E4A9-9618-474A-9331-6AA7139D2F1B}"/>
+                <a16:creationId xmlns:a16="http://schemas.microsoft.com/office/drawing/2014/main" xmlns="" id="{1012E4A9-9618-474A-9331-6AA7139D2F1B}"/>
               </a:ext>
             </a:extLst>
           </p:cNvPr>
@@ -8113,7 +8160,7 @@
           <p:cNvPr id="2" name="Title 1">
             <a:extLst>
               <a:ext uri="{FF2B5EF4-FFF2-40B4-BE49-F238E27FC236}">
-                <a16:creationId xmlns:a16="http://schemas.microsoft.com/office/drawing/2014/main" id="{3FB225A7-0B19-4E85-AB4D-2A109FC9332F}"/>
+                <a16:creationId xmlns:a16="http://schemas.microsoft.com/office/drawing/2014/main" xmlns="" id="{3FB225A7-0B19-4E85-AB4D-2A109FC9332F}"/>
               </a:ext>
             </a:extLst>
           </p:cNvPr>
@@ -8141,7 +8188,7 @@
           <p:cNvPr id="3" name="Content Placeholder 2">
             <a:extLst>
               <a:ext uri="{FF2B5EF4-FFF2-40B4-BE49-F238E27FC236}">
-                <a16:creationId xmlns:a16="http://schemas.microsoft.com/office/drawing/2014/main" id="{5BCFBA74-D712-4D15-9A4B-F6FF1DCAFF27}"/>
+                <a16:creationId xmlns:a16="http://schemas.microsoft.com/office/drawing/2014/main" xmlns="" id="{5BCFBA74-D712-4D15-9A4B-F6FF1DCAFF27}"/>
               </a:ext>
             </a:extLst>
           </p:cNvPr>
@@ -8243,7 +8290,7 @@
           <p:cNvPr id="4" name="Picture 3">
             <a:extLst>
               <a:ext uri="{FF2B5EF4-FFF2-40B4-BE49-F238E27FC236}">
-                <a16:creationId xmlns:a16="http://schemas.microsoft.com/office/drawing/2014/main" id="{5D9B7A4F-955C-4A1F-A039-D7D619A55ECD}"/>
+                <a16:creationId xmlns:a16="http://schemas.microsoft.com/office/drawing/2014/main" xmlns="" id="{5D9B7A4F-955C-4A1F-A039-D7D619A55ECD}"/>
               </a:ext>
             </a:extLst>
           </p:cNvPr>
@@ -8303,7 +8350,7 @@
           <p:cNvPr id="2" name="Title 1">
             <a:extLst>
               <a:ext uri="{FF2B5EF4-FFF2-40B4-BE49-F238E27FC236}">
-                <a16:creationId xmlns:a16="http://schemas.microsoft.com/office/drawing/2014/main" id="{63B1D52C-7DF2-4B4C-B0E6-51AC30EC2DFE}"/>
+                <a16:creationId xmlns:a16="http://schemas.microsoft.com/office/drawing/2014/main" xmlns="" id="{63B1D52C-7DF2-4B4C-B0E6-51AC30EC2DFE}"/>
               </a:ext>
             </a:extLst>
           </p:cNvPr>
@@ -8331,7 +8378,7 @@
           <p:cNvPr id="3" name="Content Placeholder 2">
             <a:extLst>
               <a:ext uri="{FF2B5EF4-FFF2-40B4-BE49-F238E27FC236}">
-                <a16:creationId xmlns:a16="http://schemas.microsoft.com/office/drawing/2014/main" id="{BA1E22D7-9AFB-456A-9099-3E4F0ACC3B81}"/>
+                <a16:creationId xmlns:a16="http://schemas.microsoft.com/office/drawing/2014/main" xmlns="" id="{BA1E22D7-9AFB-456A-9099-3E4F0ACC3B81}"/>
               </a:ext>
             </a:extLst>
           </p:cNvPr>
@@ -8479,7 +8526,7 @@
           <p:cNvPr id="2" name="Title 1">
             <a:extLst>
               <a:ext uri="{FF2B5EF4-FFF2-40B4-BE49-F238E27FC236}">
-                <a16:creationId xmlns:a16="http://schemas.microsoft.com/office/drawing/2014/main" id="{E08B723E-0307-4699-893C-8704F1A5F8DC}"/>
+                <a16:creationId xmlns:a16="http://schemas.microsoft.com/office/drawing/2014/main" xmlns="" id="{E08B723E-0307-4699-893C-8704F1A5F8DC}"/>
               </a:ext>
             </a:extLst>
           </p:cNvPr>
@@ -8507,7 +8554,7 @@
           <p:cNvPr id="3" name="Content Placeholder 2">
             <a:extLst>
               <a:ext uri="{FF2B5EF4-FFF2-40B4-BE49-F238E27FC236}">
-                <a16:creationId xmlns:a16="http://schemas.microsoft.com/office/drawing/2014/main" id="{2BBD25C0-A2C8-43BF-8670-176E2C8F0BEE}"/>
+                <a16:creationId xmlns:a16="http://schemas.microsoft.com/office/drawing/2014/main" xmlns="" id="{2BBD25C0-A2C8-43BF-8670-176E2C8F0BEE}"/>
               </a:ext>
             </a:extLst>
           </p:cNvPr>
@@ -8559,7 +8606,7 @@
           <p:cNvPr id="6" name="Picture 5">
             <a:extLst>
               <a:ext uri="{FF2B5EF4-FFF2-40B4-BE49-F238E27FC236}">
-                <a16:creationId xmlns:a16="http://schemas.microsoft.com/office/drawing/2014/main" id="{8255EFEB-FC3E-4577-BA1C-2AE6DB2AD2DF}"/>
+                <a16:creationId xmlns:a16="http://schemas.microsoft.com/office/drawing/2014/main" xmlns="" id="{8255EFEB-FC3E-4577-BA1C-2AE6DB2AD2DF}"/>
               </a:ext>
             </a:extLst>
           </p:cNvPr>
@@ -8619,7 +8666,7 @@
           <p:cNvPr id="2" name="Title 1">
             <a:extLst>
               <a:ext uri="{FF2B5EF4-FFF2-40B4-BE49-F238E27FC236}">
-                <a16:creationId xmlns:a16="http://schemas.microsoft.com/office/drawing/2014/main" id="{A0683BDD-6EA0-496D-9725-8299F9219845}"/>
+                <a16:creationId xmlns:a16="http://schemas.microsoft.com/office/drawing/2014/main" xmlns="" id="{A0683BDD-6EA0-496D-9725-8299F9219845}"/>
               </a:ext>
             </a:extLst>
           </p:cNvPr>
@@ -8647,7 +8694,7 @@
           <p:cNvPr id="3" name="Content Placeholder 2">
             <a:extLst>
               <a:ext uri="{FF2B5EF4-FFF2-40B4-BE49-F238E27FC236}">
-                <a16:creationId xmlns:a16="http://schemas.microsoft.com/office/drawing/2014/main" id="{DBC7270B-EFD6-4B8A-BAFE-CDC53D0C6652}"/>
+                <a16:creationId xmlns:a16="http://schemas.microsoft.com/office/drawing/2014/main" xmlns="" id="{DBC7270B-EFD6-4B8A-BAFE-CDC53D0C6652}"/>
               </a:ext>
             </a:extLst>
           </p:cNvPr>
@@ -8730,7 +8777,7 @@
           <p:cNvPr id="5" name="Picture 4">
             <a:extLst>
               <a:ext uri="{FF2B5EF4-FFF2-40B4-BE49-F238E27FC236}">
-                <a16:creationId xmlns:a16="http://schemas.microsoft.com/office/drawing/2014/main" id="{021BD719-A5DB-4A2D-A5E0-3D5BF86F075B}"/>
+                <a16:creationId xmlns:a16="http://schemas.microsoft.com/office/drawing/2014/main" xmlns="" id="{021BD719-A5DB-4A2D-A5E0-3D5BF86F075B}"/>
               </a:ext>
             </a:extLst>
           </p:cNvPr>
@@ -8760,7 +8807,7 @@
           <p:cNvPr id="6" name="Rectangle 5">
             <a:extLst>
               <a:ext uri="{FF2B5EF4-FFF2-40B4-BE49-F238E27FC236}">
-                <a16:creationId xmlns:a16="http://schemas.microsoft.com/office/drawing/2014/main" id="{7E361750-6A10-44F7-8296-33FB6735DA3F}"/>
+                <a16:creationId xmlns:a16="http://schemas.microsoft.com/office/drawing/2014/main" xmlns="" id="{7E361750-6A10-44F7-8296-33FB6735DA3F}"/>
               </a:ext>
             </a:extLst>
           </p:cNvPr>
@@ -8808,7 +8855,7 @@
           <p:cNvPr id="7" name="Rectangle 6">
             <a:extLst>
               <a:ext uri="{FF2B5EF4-FFF2-40B4-BE49-F238E27FC236}">
-                <a16:creationId xmlns:a16="http://schemas.microsoft.com/office/drawing/2014/main" id="{5D95F7CB-D8B1-4CA4-B36A-9A5D11453FE3}"/>
+                <a16:creationId xmlns:a16="http://schemas.microsoft.com/office/drawing/2014/main" xmlns="" id="{5D95F7CB-D8B1-4CA4-B36A-9A5D11453FE3}"/>
               </a:ext>
             </a:extLst>
           </p:cNvPr>
@@ -8856,7 +8903,7 @@
           <p:cNvPr id="9" name="Straight Arrow Connector 8">
             <a:extLst>
               <a:ext uri="{FF2B5EF4-FFF2-40B4-BE49-F238E27FC236}">
-                <a16:creationId xmlns:a16="http://schemas.microsoft.com/office/drawing/2014/main" id="{30FB7597-BFB8-4C75-A18E-2B41CAF86CE3}"/>
+                <a16:creationId xmlns:a16="http://schemas.microsoft.com/office/drawing/2014/main" xmlns="" id="{30FB7597-BFB8-4C75-A18E-2B41CAF86CE3}"/>
               </a:ext>
             </a:extLst>
           </p:cNvPr>
@@ -8897,7 +8944,7 @@
           <p:cNvPr id="11" name="Straight Arrow Connector 10">
             <a:extLst>
               <a:ext uri="{FF2B5EF4-FFF2-40B4-BE49-F238E27FC236}">
-                <a16:creationId xmlns:a16="http://schemas.microsoft.com/office/drawing/2014/main" id="{E8F8F61B-C7D8-4F13-B162-347892F3C99A}"/>
+                <a16:creationId xmlns:a16="http://schemas.microsoft.com/office/drawing/2014/main" xmlns="" id="{E8F8F61B-C7D8-4F13-B162-347892F3C99A}"/>
               </a:ext>
             </a:extLst>
           </p:cNvPr>
@@ -8938,7 +8985,7 @@
           <p:cNvPr id="12" name="Rectangle 11">
             <a:extLst>
               <a:ext uri="{FF2B5EF4-FFF2-40B4-BE49-F238E27FC236}">
-                <a16:creationId xmlns:a16="http://schemas.microsoft.com/office/drawing/2014/main" id="{D037BB73-5010-4F19-BDD6-C439F4B60AEA}"/>
+                <a16:creationId xmlns:a16="http://schemas.microsoft.com/office/drawing/2014/main" xmlns="" id="{D037BB73-5010-4F19-BDD6-C439F4B60AEA}"/>
               </a:ext>
             </a:extLst>
           </p:cNvPr>
@@ -8986,7 +9033,7 @@
           <p:cNvPr id="14" name="Straight Arrow Connector 13">
             <a:extLst>
               <a:ext uri="{FF2B5EF4-FFF2-40B4-BE49-F238E27FC236}">
-                <a16:creationId xmlns:a16="http://schemas.microsoft.com/office/drawing/2014/main" id="{19F95CB8-E95E-44F0-8ED7-F4AB75938EA9}"/>
+                <a16:creationId xmlns:a16="http://schemas.microsoft.com/office/drawing/2014/main" xmlns="" id="{19F95CB8-E95E-44F0-8ED7-F4AB75938EA9}"/>
               </a:ext>
             </a:extLst>
           </p:cNvPr>
@@ -9057,7 +9104,7 @@
           <p:cNvPr id="2" name="Title 1">
             <a:extLst>
               <a:ext uri="{FF2B5EF4-FFF2-40B4-BE49-F238E27FC236}">
-                <a16:creationId xmlns:a16="http://schemas.microsoft.com/office/drawing/2014/main" id="{64C2DAF1-1241-4A09-86CF-90EBFEF9DAF9}"/>
+                <a16:creationId xmlns:a16="http://schemas.microsoft.com/office/drawing/2014/main" xmlns="" id="{64C2DAF1-1241-4A09-86CF-90EBFEF9DAF9}"/>
               </a:ext>
             </a:extLst>
           </p:cNvPr>
@@ -9085,7 +9132,7 @@
           <p:cNvPr id="3" name="Content Placeholder 2">
             <a:extLst>
               <a:ext uri="{FF2B5EF4-FFF2-40B4-BE49-F238E27FC236}">
-                <a16:creationId xmlns:a16="http://schemas.microsoft.com/office/drawing/2014/main" id="{F66BEE3F-81AC-43CC-BEF1-7B006C6C86C1}"/>
+                <a16:creationId xmlns:a16="http://schemas.microsoft.com/office/drawing/2014/main" xmlns="" id="{F66BEE3F-81AC-43CC-BEF1-7B006C6C86C1}"/>
               </a:ext>
             </a:extLst>
           </p:cNvPr>
@@ -9177,12 +9224,35 @@
                   </a:schemeClr>
                 </a:solidFill>
               </a:rPr>
-              <a:t>INT NOT NULL AUTO_INCREMENT</a:t>
-            </a:r>
-            <a:r>
-              <a:rPr lang="en-US" dirty="0"/>
+              <a:t>INT NOT </a:t>
+            </a:r>
+            <a:r>
+              <a:rPr lang="en-US">
+                <a:solidFill>
+                  <a:schemeClr val="accent1">
+                    <a:lumMod val="60000"/>
+                    <a:lumOff val="40000"/>
+                  </a:schemeClr>
+                </a:solidFill>
+              </a:rPr>
+              <a:t>NULL </a:t>
+            </a:r>
+            <a:r>
+              <a:rPr lang="en-US" smtClean="0">
+                <a:solidFill>
+                  <a:schemeClr val="accent1">
+                    <a:lumMod val="60000"/>
+                    <a:lumOff val="40000"/>
+                  </a:schemeClr>
+                </a:solidFill>
+              </a:rPr>
+              <a:t>IDENTITY</a:t>
+            </a:r>
+            <a:r>
+              <a:rPr lang="en-US" smtClean="0"/>
               <a:t>, </a:t>
             </a:r>
+            <a:endParaRPr lang="en-US" dirty="0"/>
           </a:p>
           <a:p>
             <a:pPr marL="0" indent="0">
@@ -9288,6 +9358,13 @@
   <p:clrMapOvr>
     <a:masterClrMapping/>
   </p:clrMapOvr>
+  <p:timing>
+    <p:tnLst>
+      <p:par>
+        <p:cTn id="1" dur="indefinite" restart="never" nodeType="tmRoot"/>
+      </p:par>
+    </p:tnLst>
+  </p:timing>
 </p:sld>
 </file>
 
@@ -9313,7 +9390,7 @@
           <p:cNvPr id="2" name="Title 1">
             <a:extLst>
               <a:ext uri="{FF2B5EF4-FFF2-40B4-BE49-F238E27FC236}">
-                <a16:creationId xmlns:a16="http://schemas.microsoft.com/office/drawing/2014/main" id="{3617A761-0313-48E9-8D1B-A5083C166943}"/>
+                <a16:creationId xmlns:a16="http://schemas.microsoft.com/office/drawing/2014/main" xmlns="" id="{3617A761-0313-48E9-8D1B-A5083C166943}"/>
               </a:ext>
             </a:extLst>
           </p:cNvPr>
@@ -9353,7 +9430,7 @@
           <p:cNvPr id="3" name="Content Placeholder 2">
             <a:extLst>
               <a:ext uri="{FF2B5EF4-FFF2-40B4-BE49-F238E27FC236}">
-                <a16:creationId xmlns:a16="http://schemas.microsoft.com/office/drawing/2014/main" id="{EF421649-3A55-4FBD-B879-E7D7E68EC1DE}"/>
+                <a16:creationId xmlns:a16="http://schemas.microsoft.com/office/drawing/2014/main" xmlns="" id="{EF421649-3A55-4FBD-B879-E7D7E68EC1DE}"/>
               </a:ext>
             </a:extLst>
           </p:cNvPr>
@@ -9511,6 +9588,13 @@
   <p:clrMapOvr>
     <a:masterClrMapping/>
   </p:clrMapOvr>
+  <p:timing>
+    <p:tnLst>
+      <p:par>
+        <p:cTn id="1" dur="indefinite" restart="never" nodeType="tmRoot"/>
+      </p:par>
+    </p:tnLst>
+  </p:timing>
 </p:sld>
 </file>
 
@@ -9536,7 +9620,7 @@
           <p:cNvPr id="2" name="Title 1">
             <a:extLst>
               <a:ext uri="{FF2B5EF4-FFF2-40B4-BE49-F238E27FC236}">
-                <a16:creationId xmlns:a16="http://schemas.microsoft.com/office/drawing/2014/main" id="{EC6CA058-D72A-43AE-8A50-6AC22ACF6F25}"/>
+                <a16:creationId xmlns:a16="http://schemas.microsoft.com/office/drawing/2014/main" xmlns="" id="{EC6CA058-D72A-43AE-8A50-6AC22ACF6F25}"/>
               </a:ext>
             </a:extLst>
           </p:cNvPr>
@@ -9584,7 +9668,7 @@
           <p:cNvPr id="3" name="Content Placeholder 2">
             <a:extLst>
               <a:ext uri="{FF2B5EF4-FFF2-40B4-BE49-F238E27FC236}">
-                <a16:creationId xmlns:a16="http://schemas.microsoft.com/office/drawing/2014/main" id="{7159C76C-96FA-408D-B8BF-B0156FDF1B36}"/>
+                <a16:creationId xmlns:a16="http://schemas.microsoft.com/office/drawing/2014/main" xmlns="" id="{7159C76C-96FA-408D-B8BF-B0156FDF1B36}"/>
               </a:ext>
             </a:extLst>
           </p:cNvPr>
@@ -9725,7 +9809,7 @@
           <p:cNvPr id="6" name="Arrow: Down 5">
             <a:extLst>
               <a:ext uri="{FF2B5EF4-FFF2-40B4-BE49-F238E27FC236}">
-                <a16:creationId xmlns:a16="http://schemas.microsoft.com/office/drawing/2014/main" id="{DB61119C-4654-462F-BC71-88FE2EBCCF36}"/>
+                <a16:creationId xmlns:a16="http://schemas.microsoft.com/office/drawing/2014/main" xmlns="" id="{DB61119C-4654-462F-BC71-88FE2EBCCF36}"/>
               </a:ext>
             </a:extLst>
           </p:cNvPr>
@@ -9771,7 +9855,7 @@
           <p:cNvPr id="7" name="Arrow: Down 6">
             <a:extLst>
               <a:ext uri="{FF2B5EF4-FFF2-40B4-BE49-F238E27FC236}">
-                <a16:creationId xmlns:a16="http://schemas.microsoft.com/office/drawing/2014/main" id="{B0C86C0A-FAAD-4AB9-9EAD-1FC18184392F}"/>
+                <a16:creationId xmlns:a16="http://schemas.microsoft.com/office/drawing/2014/main" xmlns="" id="{B0C86C0A-FAAD-4AB9-9EAD-1FC18184392F}"/>
               </a:ext>
             </a:extLst>
           </p:cNvPr>
@@ -9817,7 +9901,7 @@
           <p:cNvPr id="8" name="Arrow: Down 7">
             <a:extLst>
               <a:ext uri="{FF2B5EF4-FFF2-40B4-BE49-F238E27FC236}">
-                <a16:creationId xmlns:a16="http://schemas.microsoft.com/office/drawing/2014/main" id="{4A72D08D-D552-4F7F-B1F3-EA4B4C2AA2C8}"/>
+                <a16:creationId xmlns:a16="http://schemas.microsoft.com/office/drawing/2014/main" xmlns="" id="{4A72D08D-D552-4F7F-B1F3-EA4B4C2AA2C8}"/>
               </a:ext>
             </a:extLst>
           </p:cNvPr>
@@ -9868,6 +9952,13 @@
   <p:clrMapOvr>
     <a:masterClrMapping/>
   </p:clrMapOvr>
+  <p:timing>
+    <p:tnLst>
+      <p:par>
+        <p:cTn id="1" dur="indefinite" restart="never" nodeType="tmRoot"/>
+      </p:par>
+    </p:tnLst>
+  </p:timing>
 </p:sld>
 </file>
 
@@ -9893,7 +9984,7 @@
           <p:cNvPr id="2" name="Title 1">
             <a:extLst>
               <a:ext uri="{FF2B5EF4-FFF2-40B4-BE49-F238E27FC236}">
-                <a16:creationId xmlns:a16="http://schemas.microsoft.com/office/drawing/2014/main" id="{86FB3653-E929-4577-ADE0-C4ABD89DEDC5}"/>
+                <a16:creationId xmlns:a16="http://schemas.microsoft.com/office/drawing/2014/main" xmlns="" id="{86FB3653-E929-4577-ADE0-C4ABD89DEDC5}"/>
               </a:ext>
             </a:extLst>
           </p:cNvPr>
@@ -9933,7 +10024,7 @@
           <p:cNvPr id="3" name="Content Placeholder 2">
             <a:extLst>
               <a:ext uri="{FF2B5EF4-FFF2-40B4-BE49-F238E27FC236}">
-                <a16:creationId xmlns:a16="http://schemas.microsoft.com/office/drawing/2014/main" id="{648307DD-E75B-42F0-BBFC-BD160CA2C2BF}"/>
+                <a16:creationId xmlns:a16="http://schemas.microsoft.com/office/drawing/2014/main" xmlns="" id="{648307DD-E75B-42F0-BBFC-BD160CA2C2BF}"/>
               </a:ext>
             </a:extLst>
           </p:cNvPr>
@@ -10040,6 +10131,13 @@
   <p:clrMapOvr>
     <a:masterClrMapping/>
   </p:clrMapOvr>
+  <p:timing>
+    <p:tnLst>
+      <p:par>
+        <p:cTn id="1" dur="indefinite" restart="never" nodeType="tmRoot"/>
+      </p:par>
+    </p:tnLst>
+  </p:timing>
 </p:sld>
 </file>
 
@@ -10065,7 +10163,7 @@
           <p:cNvPr id="2" name="Title 1">
             <a:extLst>
               <a:ext uri="{FF2B5EF4-FFF2-40B4-BE49-F238E27FC236}">
-                <a16:creationId xmlns:a16="http://schemas.microsoft.com/office/drawing/2014/main" id="{E6543001-B61C-48BF-B02B-D69D402008E5}"/>
+                <a16:creationId xmlns:a16="http://schemas.microsoft.com/office/drawing/2014/main" xmlns="" id="{E6543001-B61C-48BF-B02B-D69D402008E5}"/>
               </a:ext>
             </a:extLst>
           </p:cNvPr>
@@ -10105,7 +10203,7 @@
           <p:cNvPr id="3" name="Content Placeholder 2">
             <a:extLst>
               <a:ext uri="{FF2B5EF4-FFF2-40B4-BE49-F238E27FC236}">
-                <a16:creationId xmlns:a16="http://schemas.microsoft.com/office/drawing/2014/main" id="{0971D5A3-8279-416B-BF94-147BE2FD7636}"/>
+                <a16:creationId xmlns:a16="http://schemas.microsoft.com/office/drawing/2014/main" xmlns="" id="{0971D5A3-8279-416B-BF94-147BE2FD7636}"/>
               </a:ext>
             </a:extLst>
           </p:cNvPr>
@@ -10214,6 +10312,13 @@
   <p:clrMapOvr>
     <a:masterClrMapping/>
   </p:clrMapOvr>
+  <p:timing>
+    <p:tnLst>
+      <p:par>
+        <p:cTn id="1" dur="indefinite" restart="never" nodeType="tmRoot"/>
+      </p:par>
+    </p:tnLst>
+  </p:timing>
 </p:sld>
 </file>
 
@@ -10239,7 +10344,7 @@
           <p:cNvPr id="2" name="Title 1">
             <a:extLst>
               <a:ext uri="{FF2B5EF4-FFF2-40B4-BE49-F238E27FC236}">
-                <a16:creationId xmlns:a16="http://schemas.microsoft.com/office/drawing/2014/main" id="{51B43FE3-DE42-4DE7-B1AE-50777FC4F64F}"/>
+                <a16:creationId xmlns:a16="http://schemas.microsoft.com/office/drawing/2014/main" xmlns="" id="{51B43FE3-DE42-4DE7-B1AE-50777FC4F64F}"/>
               </a:ext>
             </a:extLst>
           </p:cNvPr>
@@ -10275,7 +10380,7 @@
           <p:cNvPr id="3" name="Content Placeholder 2">
             <a:extLst>
               <a:ext uri="{FF2B5EF4-FFF2-40B4-BE49-F238E27FC236}">
-                <a16:creationId xmlns:a16="http://schemas.microsoft.com/office/drawing/2014/main" id="{5C997DE6-F548-4595-867D-25C27E66D07F}"/>
+                <a16:creationId xmlns:a16="http://schemas.microsoft.com/office/drawing/2014/main" xmlns="" id="{5C997DE6-F548-4595-867D-25C27E66D07F}"/>
               </a:ext>
             </a:extLst>
           </p:cNvPr>
@@ -10422,7 +10527,7 @@
           <p:cNvPr id="4" name="Arrow: Down 3">
             <a:extLst>
               <a:ext uri="{FF2B5EF4-FFF2-40B4-BE49-F238E27FC236}">
-                <a16:creationId xmlns:a16="http://schemas.microsoft.com/office/drawing/2014/main" id="{A70FF39D-E71F-4D5E-A678-FF1EC8BCAF35}"/>
+                <a16:creationId xmlns:a16="http://schemas.microsoft.com/office/drawing/2014/main" xmlns="" id="{A70FF39D-E71F-4D5E-A678-FF1EC8BCAF35}"/>
               </a:ext>
             </a:extLst>
           </p:cNvPr>
@@ -10468,7 +10573,7 @@
           <p:cNvPr id="5" name="Arrow: Down 4">
             <a:extLst>
               <a:ext uri="{FF2B5EF4-FFF2-40B4-BE49-F238E27FC236}">
-                <a16:creationId xmlns:a16="http://schemas.microsoft.com/office/drawing/2014/main" id="{389DC80E-5CF2-4CAE-9A4D-2034AA4B056E}"/>
+                <a16:creationId xmlns:a16="http://schemas.microsoft.com/office/drawing/2014/main" xmlns="" id="{389DC80E-5CF2-4CAE-9A4D-2034AA4B056E}"/>
               </a:ext>
             </a:extLst>
           </p:cNvPr>
@@ -10519,6 +10624,13 @@
   <p:clrMapOvr>
     <a:masterClrMapping/>
   </p:clrMapOvr>
+  <p:timing>
+    <p:tnLst>
+      <p:par>
+        <p:cTn id="1" dur="indefinite" restart="never" nodeType="tmRoot"/>
+      </p:par>
+    </p:tnLst>
+  </p:timing>
 </p:sld>
 </file>
 

</xml_diff>